<commit_message>
Atualizaçao dos slides da apresentação final
</commit_message>
<xml_diff>
--- a/documentacao/G5_Apresentacao2sem2014 final.pptx
+++ b/documentacao/G5_Apresentacao2sem2014 final.pptx
@@ -5,10 +5,10 @@
     <p:sldMasterId id="2147483657" r:id="rId1"/>
   </p:sldMasterIdLst>
   <p:notesMasterIdLst>
-    <p:notesMasterId r:id="rId40"/>
+    <p:notesMasterId r:id="rId41"/>
   </p:notesMasterIdLst>
   <p:handoutMasterIdLst>
-    <p:handoutMasterId r:id="rId41"/>
+    <p:handoutMasterId r:id="rId42"/>
   </p:handoutMasterIdLst>
   <p:sldIdLst>
     <p:sldId id="256" r:id="rId2"/>
@@ -38,17 +38,18 @@
     <p:sldId id="298" r:id="rId26"/>
     <p:sldId id="299" r:id="rId27"/>
     <p:sldId id="300" r:id="rId28"/>
-    <p:sldId id="297" r:id="rId29"/>
-    <p:sldId id="291" r:id="rId30"/>
+    <p:sldId id="291" r:id="rId29"/>
+    <p:sldId id="305" r:id="rId30"/>
     <p:sldId id="301" r:id="rId31"/>
-    <p:sldId id="302" r:id="rId32"/>
-    <p:sldId id="292" r:id="rId33"/>
+    <p:sldId id="306" r:id="rId32"/>
+    <p:sldId id="302" r:id="rId33"/>
     <p:sldId id="303" r:id="rId34"/>
-    <p:sldId id="304" r:id="rId35"/>
-    <p:sldId id="281" r:id="rId36"/>
+    <p:sldId id="307" r:id="rId35"/>
+    <p:sldId id="308" r:id="rId36"/>
     <p:sldId id="289" r:id="rId37"/>
     <p:sldId id="282" r:id="rId38"/>
-    <p:sldId id="278" r:id="rId39"/>
+    <p:sldId id="309" r:id="rId39"/>
+    <p:sldId id="278" r:id="rId40"/>
   </p:sldIdLst>
   <p:sldSz cx="9144000" cy="6858000" type="screen4x3"/>
   <p:notesSz cx="7010400" cy="9296400"/>
@@ -263,7 +264,7 @@
             <a:fld id="{387DC7E4-63C1-42C9-AC56-2D8DD4349572}" type="datetimeFigureOut">
               <a:rPr lang="pt-BR" smtClean="0"/>
               <a:pPr/>
-              <a:t>1/12/2014</a:t>
+              <a:t>04/12/2014</a:t>
             </a:fld>
             <a:endParaRPr lang="pt-BR" dirty="0"/>
           </a:p>
@@ -4944,7 +4945,7 @@
           <a:p>
             <a:r>
               <a:rPr lang="pt-BR" dirty="0" smtClean="0"/>
-              <a:t>29/09/2014</a:t>
+              <a:t>05/12/2014</a:t>
             </a:r>
             <a:endParaRPr lang="pt-BR" dirty="0"/>
           </a:p>
@@ -5101,7 +5102,7 @@
           <a:p>
             <a:r>
               <a:rPr lang="pt-BR" dirty="0" smtClean="0"/>
-              <a:t>29/09/2014</a:t>
+              <a:t>05/12/2014</a:t>
             </a:r>
             <a:endParaRPr lang="pt-BR" dirty="0"/>
           </a:p>
@@ -5301,7 +5302,7 @@
           <a:p>
             <a:r>
               <a:rPr lang="pt-BR" dirty="0" smtClean="0"/>
-              <a:t>29/09/2014</a:t>
+              <a:t>05/12/2014</a:t>
             </a:r>
             <a:endParaRPr lang="pt-BR" dirty="0"/>
           </a:p>
@@ -5498,7 +5499,7 @@
           <a:p>
             <a:r>
               <a:rPr lang="pt-BR" dirty="0" smtClean="0"/>
-              <a:t>29/09/2014</a:t>
+              <a:t>05/12/2014</a:t>
             </a:r>
             <a:endParaRPr lang="pt-BR" dirty="0"/>
           </a:p>
@@ -5693,7 +5694,7 @@
           <a:p>
             <a:r>
               <a:rPr lang="pt-BR" dirty="0" smtClean="0"/>
-              <a:t>29/09/2014</a:t>
+              <a:t>05/12/2014</a:t>
             </a:r>
             <a:endParaRPr lang="pt-BR" dirty="0"/>
           </a:p>
@@ -5834,7 +5835,7 @@
           <a:p>
             <a:r>
               <a:rPr lang="pt-BR" dirty="0" smtClean="0"/>
-              <a:t>Escopo</a:t>
+              <a:t>Escopo do produto </a:t>
             </a:r>
             <a:endParaRPr lang="pt-BR" dirty="0"/>
           </a:p>
@@ -6026,7 +6027,7 @@
           <a:p>
             <a:r>
               <a:rPr lang="pt-BR" dirty="0" smtClean="0"/>
-              <a:t>29/09/204</a:t>
+              <a:t>05/12/2014</a:t>
             </a:r>
             <a:endParaRPr lang="pt-BR" dirty="0"/>
           </a:p>
@@ -6653,6 +6654,14 @@
           <a:bodyPr/>
           <a:lstStyle/>
           <a:p>
+            <a:r>
+              <a:rPr lang="pt-BR" dirty="0" smtClean="0"/>
+              <a:t>05/12/2014</a:t>
+            </a:r>
+            <a:r>
+              <a:rPr lang="pt-BR" dirty="0" smtClean="0"/>
+              <a:t> 05/12/2014</a:t>
+            </a:r>
             <a:endParaRPr lang="pt-BR" dirty="0"/>
           </a:p>
         </p:txBody>
@@ -6801,7 +6810,6 @@
               <a:rPr lang="pt-BR" sz="3600" dirty="0" smtClean="0"/>
               <a:t>Modelo lógico</a:t>
             </a:r>
-            <a:endParaRPr lang="pt-BR" sz="3600" dirty="0" smtClean="0"/>
           </a:p>
         </p:txBody>
       </p:sp>
@@ -6968,11 +6976,7 @@
             </a:r>
             <a:r>
               <a:rPr lang="pt-BR" i="1" dirty="0" smtClean="0"/>
-              <a:t>Menu </a:t>
-            </a:r>
-            <a:r>
-              <a:rPr lang="pt-BR" i="1" dirty="0" smtClean="0"/>
-              <a:t>de imersão</a:t>
+              <a:t>Menu de imersão</a:t>
             </a:r>
             <a:endParaRPr lang="pt-BR" dirty="0" smtClean="0"/>
           </a:p>
@@ -6982,15 +6986,7 @@
             </a:pPr>
             <a:r>
               <a:rPr lang="pt-BR" dirty="0" smtClean="0"/>
-              <a:t>    O </a:t>
-            </a:r>
-            <a:r>
-              <a:rPr lang="pt-BR" dirty="0" smtClean="0"/>
-              <a:t>menu deve ficar imerso no conteúdo que é oferecido, ocupando um espaço mínimo da tela, porém estando sempre visível para o </a:t>
-            </a:r>
-            <a:r>
-              <a:rPr lang="pt-BR" dirty="0" smtClean="0"/>
-              <a:t>usuário</a:t>
+              <a:t>    O menu deve ficar imerso no conteúdo que é oferecido, ocupando um espaço mínimo da tela, porém estando sempre visível para o usuário</a:t>
             </a:r>
           </a:p>
           <a:p>
@@ -7014,11 +7010,7 @@
             </a:r>
             <a:r>
               <a:rPr lang="pt-BR" i="1" dirty="0" smtClean="0"/>
-              <a:t>Consistência </a:t>
-            </a:r>
-            <a:r>
-              <a:rPr lang="pt-BR" i="1" dirty="0" smtClean="0"/>
-              <a:t>e padrões</a:t>
+              <a:t>Consistência e padrões</a:t>
             </a:r>
             <a:endParaRPr lang="pt-BR" dirty="0" smtClean="0"/>
           </a:p>
@@ -7028,11 +7020,7 @@
             </a:pPr>
             <a:r>
               <a:rPr lang="pt-BR" dirty="0" smtClean="0"/>
-              <a:t>   Todas </a:t>
-            </a:r>
-            <a:r>
-              <a:rPr lang="pt-BR" dirty="0" smtClean="0"/>
-              <a:t>as telas devem manter o mesmo padrão da tela inicial</a:t>
+              <a:t>   Todas as telas devem manter o mesmo padrão da tela inicial</a:t>
             </a:r>
           </a:p>
           <a:p>
@@ -7118,25 +7106,8 @@
             <a:pPr algn="just"/>
             <a:r>
               <a:rPr lang="pt-BR" dirty="0" smtClean="0"/>
-              <a:t>GAED – sistema </a:t>
-            </a:r>
-            <a:r>
-              <a:rPr lang="pt-BR" dirty="0" smtClean="0"/>
-              <a:t>para </a:t>
-            </a:r>
-            <a:r>
-              <a:rPr lang="pt-BR" dirty="0" smtClean="0"/>
-              <a:t>o </a:t>
-            </a:r>
-            <a:r>
-              <a:rPr lang="pt-BR" dirty="0" smtClean="0"/>
-              <a:t>processo de gestão, </a:t>
-            </a:r>
-            <a:r>
-              <a:rPr lang="pt-BR" dirty="0" smtClean="0"/>
-              <a:t>escolar, que registra e comunica dados e informações de alunos.</a:t>
-            </a:r>
-            <a:endParaRPr lang="pt-BR" dirty="0" smtClean="0"/>
+              <a:t>GAED – sistema para o processo de gestão, escolar, que registra e comunica dados e informações de alunos.</a:t>
+            </a:r>
           </a:p>
           <a:p>
             <a:pPr>
@@ -7170,10 +7141,8 @@
           <a:p>
             <a:r>
               <a:rPr lang="pt-BR" dirty="0" smtClean="0"/>
-              <a:t>29/09/2014</a:t>
-            </a:r>
-          </a:p>
-          <a:p>
+              <a:t>05/12/2014</a:t>
+            </a:r>
             <a:endParaRPr lang="pt-BR" dirty="0"/>
           </a:p>
         </p:txBody>
@@ -7323,25 +7292,17 @@
             </a:r>
             <a:r>
               <a:rPr lang="pt-BR" i="1" dirty="0" smtClean="0"/>
-              <a:t>Prevenção </a:t>
-            </a:r>
-            <a:r>
-              <a:rPr lang="pt-BR" i="1" dirty="0" smtClean="0"/>
-              <a:t>de erros</a:t>
+              <a:t>Prevenção de erros</a:t>
             </a:r>
             <a:endParaRPr lang="pt-BR" dirty="0" smtClean="0"/>
           </a:p>
           <a:p>
-            <a:pPr>
+            <a:pPr algn="just">
               <a:buNone/>
             </a:pPr>
             <a:r>
               <a:rPr lang="pt-BR" dirty="0" smtClean="0"/>
-              <a:t>    Por </a:t>
-            </a:r>
-            <a:r>
-              <a:rPr lang="pt-BR" dirty="0" smtClean="0"/>
-              <a:t>causa de algum dado digitado incorreto num cadastro, não for possível inseri-lo e ocorrer erro, o sistema deve retornar a tela de cadastro, informar precisamente o erro, permitir ao usuário corrigir o dado sem que seja preciso preencher todas as informações novamente.</a:t>
+              <a:t>    Por causa de algum dado digitado incorreto num cadastro, não for possível inseri-lo e ocorrer erro, o sistema deve retornar a tela de cadastro, informar precisamente o erro, permitir ao usuário corrigir o dado sem que seja preciso preencher todas as informações novamente.</a:t>
             </a:r>
             <a:endParaRPr lang="pt-BR" dirty="0"/>
           </a:p>
@@ -7439,33 +7400,17 @@
             </a:r>
             <a:r>
               <a:rPr lang="pt-BR" i="1" dirty="0" smtClean="0"/>
-              <a:t>Estrutura </a:t>
-            </a:r>
-            <a:r>
-              <a:rPr lang="pt-BR" i="1" dirty="0" smtClean="0"/>
-              <a:t>de página </a:t>
-            </a:r>
-            <a:r>
-              <a:rPr lang="pt-BR" i="1" dirty="0" smtClean="0"/>
-              <a:t>– </a:t>
-            </a:r>
-            <a:r>
-              <a:rPr lang="pt-BR" i="1" dirty="0" smtClean="0"/>
-              <a:t>Geral</a:t>
+              <a:t>Estrutura de página – Geral</a:t>
             </a:r>
             <a:endParaRPr lang="pt-BR" dirty="0" smtClean="0"/>
           </a:p>
           <a:p>
-            <a:pPr>
+            <a:pPr algn="just">
               <a:buNone/>
             </a:pPr>
             <a:r>
               <a:rPr lang="pt-BR" dirty="0" smtClean="0"/>
-              <a:t>    Limita </a:t>
-            </a:r>
-            <a:r>
-              <a:rPr lang="pt-BR" dirty="0" smtClean="0"/>
-              <a:t>a quantia de espaço em branco (área sem texto, gráfico, etc.) em páginas que são usadas para leitura rápida e procura. Facilita a habilidade de usuários para entender a informação limitando a quantia de espaço branco.</a:t>
+              <a:t>    Limita a quantia de espaço em branco (área sem texto, gráfico, etc.) em páginas que são usadas para leitura rápida e procura. Facilita a habilidade de usuários para entender a informação limitando a quantia de espaço branco.</a:t>
             </a:r>
           </a:p>
           <a:p>
@@ -7557,23 +7502,15 @@
             </a:r>
             <a:r>
               <a:rPr lang="pt-BR" i="1" dirty="0" smtClean="0"/>
-              <a:t> </a:t>
+              <a:t> 5</a:t>
+            </a:r>
+            <a:r>
+              <a:rPr lang="pt-BR" dirty="0" smtClean="0"/>
+              <a:t>:    </a:t>
             </a:r>
             <a:r>
               <a:rPr lang="pt-BR" i="1" dirty="0" smtClean="0"/>
-              <a:t>5</a:t>
-            </a:r>
-            <a:r>
-              <a:rPr lang="pt-BR" dirty="0" smtClean="0"/>
-              <a:t>:</a:t>
-            </a:r>
-            <a:r>
-              <a:rPr lang="pt-BR" i="1" dirty="0" smtClean="0"/>
-              <a:t>Padrões </a:t>
-            </a:r>
-            <a:r>
-              <a:rPr lang="pt-BR" i="1" dirty="0" smtClean="0"/>
-              <a:t>comuns ao Usuário</a:t>
+              <a:t>Padrões comuns ao Usuário</a:t>
             </a:r>
             <a:endParaRPr lang="pt-BR" dirty="0" smtClean="0"/>
           </a:p>
@@ -7583,11 +7520,7 @@
             </a:pPr>
             <a:r>
               <a:rPr lang="pt-BR" dirty="0" smtClean="0"/>
-              <a:t>     Assegura </a:t>
-            </a:r>
-            <a:r>
-              <a:rPr lang="pt-BR" dirty="0" smtClean="0"/>
-              <a:t>que o formato de artigos comuns seja consistente de uma página para outra.</a:t>
+              <a:t>     Assegura que o formato de artigos comuns seja consistente de uma página para outra.</a:t>
             </a:r>
           </a:p>
           <a:p>
@@ -7612,27 +7545,24 @@
               <a:rPr lang="pt-BR" dirty="0" smtClean="0"/>
               <a:t>: </a:t>
             </a:r>
-            <a:r>
-              <a:rPr lang="pt-BR" i="1" dirty="0" smtClean="0"/>
-              <a:t>Textos </a:t>
-            </a:r>
-            <a:r>
-              <a:rPr lang="pt-BR" i="1" dirty="0" smtClean="0"/>
-              <a:t>e estilos para consistência visual</a:t>
-            </a:r>
-            <a:endParaRPr lang="pt-BR" dirty="0" smtClean="0"/>
           </a:p>
           <a:p>
             <a:pPr>
               <a:buNone/>
             </a:pPr>
             <a:r>
-              <a:rPr lang="pt-BR" dirty="0" smtClean="0"/>
-              <a:t>    Assegura </a:t>
-            </a:r>
-            <a:r>
-              <a:rPr lang="pt-BR" dirty="0" smtClean="0"/>
-              <a:t>consistência visual de elementos de site da Web dentro e entre </a:t>
+              <a:rPr lang="pt-BR" i="1" dirty="0" smtClean="0"/>
+              <a:t>           Textos e estilos para consistência visual</a:t>
+            </a:r>
+            <a:endParaRPr lang="pt-BR" dirty="0" smtClean="0"/>
+          </a:p>
+          <a:p>
+            <a:pPr>
+              <a:buNone/>
+            </a:pPr>
+            <a:r>
+              <a:rPr lang="pt-BR" dirty="0" smtClean="0"/>
+              <a:t>    Assegura consistência visual de elementos de site da Web dentro e entre </a:t>
             </a:r>
             <a:r>
               <a:rPr lang="pt-BR" dirty="0" err="1" smtClean="0"/>
@@ -7748,11 +7678,7 @@
             </a:r>
             <a:r>
               <a:rPr lang="pt-BR" i="1" dirty="0" smtClean="0"/>
-              <a:t> </a:t>
-            </a:r>
-            <a:r>
-              <a:rPr lang="pt-BR" i="1" dirty="0" smtClean="0"/>
-              <a:t>e </a:t>
+              <a:t> e </a:t>
             </a:r>
             <a:r>
               <a:rPr lang="pt-BR" i="1" dirty="0" err="1" smtClean="0"/>
@@ -7761,22 +7687,13 @@
             <a:endParaRPr lang="pt-BR" dirty="0" smtClean="0"/>
           </a:p>
           <a:p>
-            <a:pPr>
+            <a:pPr algn="just">
               <a:buNone/>
             </a:pPr>
             <a:r>
               <a:rPr lang="pt-BR" dirty="0" smtClean="0"/>
-              <a:t>   Se precisar de tempo, </a:t>
-            </a:r>
-            <a:r>
-              <a:rPr lang="pt-BR" dirty="0" smtClean="0"/>
-              <a:t>abrindo e mudando de páginas quando os usuários estiverem lendo para </a:t>
-            </a:r>
-            <a:r>
-              <a:rPr lang="pt-BR" dirty="0" smtClean="0"/>
-              <a:t>compreensão, usar barra de rolagem.</a:t>
-            </a:r>
-            <a:endParaRPr lang="pt-BR" dirty="0" smtClean="0"/>
+              <a:t>   Se precisar de tempo, abrindo e mudando de páginas quando os usuários estiverem lendo para compreensão, usar barra de rolagem.</a:t>
+            </a:r>
           </a:p>
           <a:p>
             <a:pPr>
@@ -7798,15 +7715,7 @@
             </a:r>
             <a:r>
               <a:rPr lang="pt-BR" i="1" dirty="0" smtClean="0"/>
-              <a:t> </a:t>
-            </a:r>
-            <a:r>
-              <a:rPr lang="pt-BR" i="1" dirty="0" smtClean="0"/>
-              <a:t>8</a:t>
-            </a:r>
-            <a:r>
-              <a:rPr lang="pt-BR" i="1" dirty="0" smtClean="0"/>
-              <a:t>: </a:t>
+              <a:t> 8: </a:t>
             </a:r>
             <a:r>
               <a:rPr lang="pt-BR" i="1" dirty="0" err="1" smtClean="0"/>
@@ -7814,11 +7723,7 @@
             </a:r>
             <a:r>
               <a:rPr lang="pt-BR" i="1" dirty="0" smtClean="0"/>
-              <a:t> </a:t>
-            </a:r>
-            <a:r>
-              <a:rPr lang="pt-BR" i="1" dirty="0" smtClean="0"/>
-              <a:t>e </a:t>
+              <a:t> e </a:t>
             </a:r>
             <a:r>
               <a:rPr lang="pt-BR" i="1" dirty="0" err="1" smtClean="0"/>
@@ -7827,20 +7732,12 @@
             <a:endParaRPr lang="pt-BR" dirty="0" smtClean="0"/>
           </a:p>
           <a:p>
-            <a:pPr>
+            <a:pPr algn="just">
               <a:buNone/>
             </a:pPr>
             <a:r>
               <a:rPr lang="pt-BR" dirty="0" smtClean="0"/>
-              <a:t>   Se </a:t>
-            </a:r>
-            <a:r>
-              <a:rPr lang="pt-BR" dirty="0" smtClean="0"/>
-              <a:t>os tempos de resposta de sistema de usuários forem razoavelmente rápidos, </a:t>
-            </a:r>
-            <a:r>
-              <a:rPr lang="pt-BR" dirty="0" smtClean="0"/>
-              <a:t>usar </a:t>
+              <a:t>   Se os tempos de resposta de sistema de usuários forem razoavelmente rápidos, usar </a:t>
             </a:r>
             <a:r>
               <a:rPr lang="pt-BR" dirty="0" err="1" smtClean="0"/>
@@ -7943,15 +7840,7 @@
             </a:r>
             <a:r>
               <a:rPr lang="pt-BR" i="1" dirty="0" smtClean="0"/>
-              <a:t> 9</a:t>
-            </a:r>
-            <a:r>
-              <a:rPr lang="pt-BR" i="1" dirty="0" smtClean="0"/>
-              <a:t>: Cabeçalho</a:t>
-            </a:r>
-            <a:r>
-              <a:rPr lang="pt-BR" i="1" dirty="0" smtClean="0"/>
-              <a:t>, títulos e rótulos</a:t>
+              <a:t> 9: Cabeçalho, títulos e rótulos</a:t>
             </a:r>
             <a:endParaRPr lang="pt-BR" dirty="0" smtClean="0"/>
           </a:p>
@@ -7961,11 +7850,7 @@
             </a:pPr>
             <a:r>
               <a:rPr lang="pt-BR" dirty="0" smtClean="0"/>
-              <a:t>   Use </a:t>
-            </a:r>
-            <a:r>
-              <a:rPr lang="pt-BR" dirty="0" smtClean="0"/>
-              <a:t>títulos descritivos livremente ao longo da página Web.</a:t>
+              <a:t>   Uso de títulos descritivos livremente ao longo da página Web.</a:t>
             </a:r>
           </a:p>
           <a:p>
@@ -7984,19 +7869,7 @@
             </a:r>
             <a:r>
               <a:rPr lang="pt-BR" i="1" dirty="0" smtClean="0"/>
-              <a:t> </a:t>
-            </a:r>
-            <a:r>
-              <a:rPr lang="pt-BR" i="1" dirty="0" smtClean="0"/>
-              <a:t>10</a:t>
-            </a:r>
-            <a:r>
-              <a:rPr lang="pt-BR" i="1" dirty="0" smtClean="0"/>
-              <a:t>:  Gráficos </a:t>
-            </a:r>
-            <a:r>
-              <a:rPr lang="pt-BR" i="1" dirty="0" smtClean="0"/>
-              <a:t>e Imagens</a:t>
+              <a:t> 10:  Gráficos e Imagens</a:t>
             </a:r>
             <a:endParaRPr lang="pt-BR" dirty="0" smtClean="0"/>
           </a:p>
@@ -8006,11 +7879,7 @@
             </a:pPr>
             <a:r>
               <a:rPr lang="pt-BR" dirty="0" smtClean="0"/>
-              <a:t>   Coloque </a:t>
-            </a:r>
-            <a:r>
-              <a:rPr lang="pt-BR" dirty="0" smtClean="0"/>
-              <a:t>o logotipo de sua organização em um lugar consistente em todas as páginas.</a:t>
+              <a:t>   Uso do logotipo de sua organização em um lugar consistente em todas as páginas.</a:t>
             </a:r>
           </a:p>
           <a:p>
@@ -8110,11 +7979,7 @@
             </a:r>
             <a:r>
               <a:rPr lang="pt-BR" i="1" dirty="0" smtClean="0"/>
-              <a:t> 11</a:t>
-            </a:r>
-            <a:r>
-              <a:rPr lang="pt-BR" i="1" dirty="0" smtClean="0"/>
-              <a:t>: Links</a:t>
+              <a:t> 11: Links</a:t>
             </a:r>
             <a:endParaRPr lang="pt-BR" dirty="0" smtClean="0"/>
           </a:p>
@@ -8124,11 +7989,7 @@
             </a:pPr>
             <a:r>
               <a:rPr lang="pt-BR" dirty="0" smtClean="0"/>
-              <a:t>  Use </a:t>
-            </a:r>
-            <a:r>
-              <a:rPr lang="pt-BR" dirty="0" smtClean="0"/>
-              <a:t>textos como links em vez de links somente com imagens. </a:t>
+              <a:t>    Uso de textos como links em vez de links somente com imagens. </a:t>
             </a:r>
           </a:p>
           <a:p>
@@ -8147,29 +8008,17 @@
             </a:r>
             <a:r>
               <a:rPr lang="pt-BR" i="1" dirty="0" smtClean="0"/>
-              <a:t> 12</a:t>
-            </a:r>
-            <a:r>
-              <a:rPr lang="pt-BR" i="1" dirty="0" smtClean="0"/>
-              <a:t>: Organização </a:t>
-            </a:r>
-            <a:r>
-              <a:rPr lang="pt-BR" i="1" dirty="0" smtClean="0"/>
-              <a:t>Conteúdo Web</a:t>
+              <a:t> 12: Organização Conteúdo Web</a:t>
             </a:r>
             <a:endParaRPr lang="pt-BR" dirty="0" smtClean="0"/>
           </a:p>
           <a:p>
-            <a:pPr>
+            <a:pPr algn="just">
               <a:buNone/>
             </a:pPr>
             <a:r>
               <a:rPr lang="pt-BR" dirty="0" smtClean="0"/>
-              <a:t>   Permitir aos </a:t>
-            </a:r>
-            <a:r>
-              <a:rPr lang="pt-BR" dirty="0" smtClean="0"/>
-              <a:t>usuários achar o que eles querem eficazmente, projeta  de forma que as tarefas mais comuns podem ser completadas facilmente com menos números de </a:t>
+              <a:t>   Permitir aos usuários achar o que eles querem eficazmente, projeta  de forma que as tarefas mais comuns podem ser completadas facilmente com menos números de </a:t>
             </a:r>
             <a:r>
               <a:rPr lang="pt-BR" dirty="0" err="1" smtClean="0"/>
@@ -8181,14 +8030,13 @@
             </a:r>
           </a:p>
           <a:p>
-            <a:pPr>
+            <a:pPr algn="just">
               <a:buNone/>
             </a:pPr>
             <a:r>
               <a:rPr lang="pt-BR" dirty="0" smtClean="0"/>
               <a:t>.</a:t>
             </a:r>
-            <a:endParaRPr lang="pt-BR" dirty="0" smtClean="0"/>
           </a:p>
           <a:p>
             <a:pPr>
@@ -8287,19 +8135,7 @@
             </a:r>
             <a:r>
               <a:rPr lang="pt-BR" i="1" dirty="0" smtClean="0"/>
-              <a:t> </a:t>
-            </a:r>
-            <a:r>
-              <a:rPr lang="pt-BR" i="1" dirty="0" smtClean="0"/>
-              <a:t>14</a:t>
-            </a:r>
-            <a:r>
-              <a:rPr lang="pt-BR" i="1" dirty="0" smtClean="0"/>
-              <a:t>: Gráficos </a:t>
-            </a:r>
-            <a:r>
-              <a:rPr lang="pt-BR" i="1" dirty="0" smtClean="0"/>
-              <a:t>e Imagens</a:t>
+              <a:t> 14: Gráficos e Imagens</a:t>
             </a:r>
             <a:endParaRPr lang="pt-BR" dirty="0" smtClean="0"/>
           </a:p>
@@ -8309,11 +8145,7 @@
             </a:pPr>
             <a:r>
               <a:rPr lang="pt-BR" dirty="0" smtClean="0"/>
-              <a:t>    Fotografias </a:t>
-            </a:r>
-            <a:r>
-              <a:rPr lang="pt-BR" dirty="0" smtClean="0"/>
-              <a:t>das pessoas podem ou não ajudar construir confiança em locais de Web.</a:t>
+              <a:t>    Fotografias das pessoas podem ou não ajudar construir confiança em locais de Web.</a:t>
             </a:r>
           </a:p>
           <a:p>
@@ -8332,15 +8164,7 @@
             </a:r>
             <a:r>
               <a:rPr lang="pt-BR" i="1" dirty="0" smtClean="0"/>
-              <a:t> 15</a:t>
-            </a:r>
-            <a:r>
-              <a:rPr lang="pt-BR" i="1" dirty="0" smtClean="0"/>
-              <a:t>: Gráficos </a:t>
-            </a:r>
-            <a:r>
-              <a:rPr lang="pt-BR" i="1" dirty="0" smtClean="0"/>
-              <a:t>e Imagens</a:t>
+              <a:t> 15: Gráficos e Imagens</a:t>
             </a:r>
             <a:endParaRPr lang="pt-BR" dirty="0" smtClean="0"/>
           </a:p>
@@ -8350,21 +8174,8 @@
             </a:pPr>
             <a:r>
               <a:rPr lang="pt-BR" dirty="0" smtClean="0"/>
-              <a:t> </a:t>
-            </a:r>
-            <a:r>
-              <a:rPr lang="pt-BR" dirty="0" smtClean="0"/>
-              <a:t>   Não </a:t>
-            </a:r>
-            <a:r>
-              <a:rPr lang="pt-BR" dirty="0" smtClean="0"/>
-              <a:t>faça imagens importantes se parecer com anúncios de bandeira ou decorações gratuitas</a:t>
-            </a:r>
-            <a:r>
-              <a:rPr lang="pt-BR" dirty="0" smtClean="0"/>
-              <a:t>.</a:t>
-            </a:r>
-            <a:endParaRPr lang="pt-BR" dirty="0" smtClean="0"/>
+              <a:t>    Não faça imagens importantes se parecer com anúncios de bandeira ou decorações gratuitas.</a:t>
+            </a:r>
           </a:p>
         </p:txBody>
       </p:sp>
@@ -8462,11 +8273,7 @@
             </a:pPr>
             <a:r>
               <a:rPr lang="pt-BR" b="1" i="1" dirty="0" smtClean="0"/>
-              <a:t> </a:t>
-            </a:r>
-            <a:r>
-              <a:rPr lang="pt-BR" b="1" i="1" dirty="0" smtClean="0"/>
-              <a:t>  </a:t>
+              <a:t>   </a:t>
             </a:r>
             <a:r>
               <a:rPr lang="pt-BR" i="1" dirty="0" err="1" smtClean="0"/>
@@ -8482,11 +8289,7 @@
             </a:r>
             <a:r>
               <a:rPr lang="pt-BR" i="1" dirty="0" smtClean="0"/>
-              <a:t>Layout </a:t>
-            </a:r>
-            <a:r>
-              <a:rPr lang="pt-BR" i="1" dirty="0" smtClean="0"/>
-              <a:t>responsivo</a:t>
+              <a:t>Layout responsivo</a:t>
             </a:r>
             <a:endParaRPr lang="pt-BR" dirty="0" smtClean="0"/>
           </a:p>
@@ -8496,24 +8299,16 @@
             </a:pPr>
             <a:r>
               <a:rPr lang="pt-BR" dirty="0" smtClean="0"/>
-              <a:t>   </a:t>
-            </a:r>
-          </a:p>
-          <a:p>
-            <a:pPr>
+              <a:t>    </a:t>
+            </a:r>
+          </a:p>
+          <a:p>
+            <a:pPr algn="just">
               <a:buNone/>
             </a:pPr>
             <a:r>
               <a:rPr lang="pt-BR" dirty="0" smtClean="0"/>
-              <a:t> </a:t>
-            </a:r>
-            <a:r>
-              <a:rPr lang="pt-BR" dirty="0" smtClean="0"/>
-              <a:t>  Apresentar </a:t>
-            </a:r>
-            <a:r>
-              <a:rPr lang="pt-BR" dirty="0" smtClean="0"/>
-              <a:t>a informação do site de forma acessível e confortável para diversos meios de acesso. Disponibilizando uma boa resolução em qualquer tamanho da tela</a:t>
+              <a:t>    Apresentar a informação do site de forma acessível e confortável para diversos meios de acesso. Disponibilizando uma boa resolução em qualquer tamanho da tela</a:t>
             </a:r>
           </a:p>
           <a:p>
@@ -8545,168 +8340,6 @@
 </file>
 
 <file path=ppt/slides/slide28.xml><?xml version="1.0" encoding="utf-8"?>
-<p:sld xmlns:a="http://schemas.openxmlformats.org/drawingml/2006/main" xmlns:r="http://schemas.openxmlformats.org/officeDocument/2006/relationships" xmlns:p="http://schemas.openxmlformats.org/presentationml/2006/main">
-  <p:cSld>
-    <p:spTree>
-      <p:nvGrpSpPr>
-        <p:cNvPr id="1" name=""/>
-        <p:cNvGrpSpPr/>
-        <p:nvPr/>
-      </p:nvGrpSpPr>
-      <p:grpSpPr>
-        <a:xfrm>
-          <a:off x="0" y="0"/>
-          <a:ext cx="0" cy="0"/>
-          <a:chOff x="0" y="0"/>
-          <a:chExt cx="0" cy="0"/>
-        </a:xfrm>
-      </p:grpSpPr>
-      <p:sp>
-        <p:nvSpPr>
-          <p:cNvPr id="2" name="Title 1"/>
-          <p:cNvSpPr>
-            <a:spLocks noGrp="1"/>
-          </p:cNvSpPr>
-          <p:nvPr>
-            <p:ph type="title"/>
-          </p:nvPr>
-        </p:nvSpPr>
-        <p:spPr/>
-        <p:txBody>
-          <a:bodyPr/>
-          <a:lstStyle/>
-          <a:p>
-            <a:r>
-              <a:rPr lang="pt-BR" dirty="0" smtClean="0"/>
-              <a:t>Interface do Usuário</a:t>
-            </a:r>
-            <a:endParaRPr lang="pt-BR" dirty="0"/>
-          </a:p>
-        </p:txBody>
-      </p:sp>
-      <p:sp>
-        <p:nvSpPr>
-          <p:cNvPr id="3" name="Content Placeholder 2"/>
-          <p:cNvSpPr>
-            <a:spLocks noGrp="1"/>
-          </p:cNvSpPr>
-          <p:nvPr>
-            <p:ph idx="1"/>
-          </p:nvPr>
-        </p:nvSpPr>
-        <p:spPr/>
-        <p:txBody>
-          <a:bodyPr/>
-          <a:lstStyle/>
-          <a:p>
-            <a:pPr>
-              <a:buNone/>
-            </a:pPr>
-            <a:r>
-              <a:rPr lang="pt-BR" i="1" dirty="0" err="1" smtClean="0"/>
-              <a:t>Guideline</a:t>
-            </a:r>
-            <a:r>
-              <a:rPr lang="pt-BR" i="1" dirty="0" smtClean="0"/>
-              <a:t> 9</a:t>
-            </a:r>
-            <a:r>
-              <a:rPr lang="pt-BR" i="1" dirty="0" smtClean="0"/>
-              <a:t>: Cabeçalho</a:t>
-            </a:r>
-            <a:r>
-              <a:rPr lang="pt-BR" i="1" dirty="0" smtClean="0"/>
-              <a:t>, títulos e rótulos</a:t>
-            </a:r>
-            <a:endParaRPr lang="pt-BR" dirty="0" smtClean="0"/>
-          </a:p>
-          <a:p>
-            <a:pPr>
-              <a:buNone/>
-            </a:pPr>
-            <a:r>
-              <a:rPr lang="pt-BR" dirty="0" smtClean="0"/>
-              <a:t>   Use </a:t>
-            </a:r>
-            <a:r>
-              <a:rPr lang="pt-BR" dirty="0" smtClean="0"/>
-              <a:t>títulos descritivos livremente ao longo da página Web.</a:t>
-            </a:r>
-          </a:p>
-          <a:p>
-            <a:pPr>
-              <a:buNone/>
-            </a:pPr>
-            <a:endParaRPr lang="en-US" dirty="0" smtClean="0"/>
-          </a:p>
-          <a:p>
-            <a:pPr>
-              <a:buNone/>
-            </a:pPr>
-            <a:r>
-              <a:rPr lang="pt-BR" i="1" dirty="0" err="1" smtClean="0"/>
-              <a:t>Guideline</a:t>
-            </a:r>
-            <a:r>
-              <a:rPr lang="pt-BR" i="1" dirty="0" smtClean="0"/>
-              <a:t> </a:t>
-            </a:r>
-            <a:r>
-              <a:rPr lang="pt-BR" i="1" dirty="0" smtClean="0"/>
-              <a:t>10</a:t>
-            </a:r>
-            <a:r>
-              <a:rPr lang="pt-BR" i="1" dirty="0" smtClean="0"/>
-              <a:t>:  Gráficos </a:t>
-            </a:r>
-            <a:r>
-              <a:rPr lang="pt-BR" i="1" dirty="0" smtClean="0"/>
-              <a:t>e Imagens</a:t>
-            </a:r>
-            <a:endParaRPr lang="pt-BR" dirty="0" smtClean="0"/>
-          </a:p>
-          <a:p>
-            <a:pPr>
-              <a:buNone/>
-            </a:pPr>
-            <a:r>
-              <a:rPr lang="pt-BR" dirty="0" smtClean="0"/>
-              <a:t>   Coloque </a:t>
-            </a:r>
-            <a:r>
-              <a:rPr lang="pt-BR" dirty="0" smtClean="0"/>
-              <a:t>o logotipo de sua organização em um lugar consistente em todas as páginas.</a:t>
-            </a:r>
-          </a:p>
-          <a:p>
-            <a:pPr>
-              <a:buNone/>
-            </a:pPr>
-            <a:endParaRPr lang="pt-BR" dirty="0"/>
-          </a:p>
-        </p:txBody>
-      </p:sp>
-    </p:spTree>
-    <p:extLst>
-      <p:ext uri="{BB962C8B-B14F-4D97-AF65-F5344CB8AC3E}">
-        <p14:creationId xmlns="" xmlns:p14="http://schemas.microsoft.com/office/powerpoint/2010/main" val="2991806747"/>
-      </p:ext>
-    </p:extLst>
-  </p:cSld>
-  <p:clrMapOvr>
-    <a:masterClrMapping/>
-  </p:clrMapOvr>
-  <p:timing>
-    <p:tnLst>
-      <p:par>
-        <p:cTn id="1" dur="indefinite" restart="never" nodeType="tmRoot"/>
-      </p:par>
-    </p:tnLst>
-  </p:timing>
-</p:sld>
-</file>
-
-<file path=ppt/slides/slide29.xml><?xml version="1.0" encoding="utf-8"?>
 <p:sld xmlns:a="http://schemas.openxmlformats.org/drawingml/2006/main" xmlns:r="http://schemas.openxmlformats.org/officeDocument/2006/relationships" xmlns:p="http://schemas.openxmlformats.org/presentationml/2006/main">
   <p:cSld>
     <p:spTree>
@@ -8800,6 +8433,102 @@
 </p:sld>
 </file>
 
+<file path=ppt/slides/slide29.xml><?xml version="1.0" encoding="utf-8"?>
+<p:sld xmlns:a="http://schemas.openxmlformats.org/drawingml/2006/main" xmlns:r="http://schemas.openxmlformats.org/officeDocument/2006/relationships" xmlns:p="http://schemas.openxmlformats.org/presentationml/2006/main">
+  <p:cSld>
+    <p:spTree>
+      <p:nvGrpSpPr>
+        <p:cNvPr id="1" name=""/>
+        <p:cNvGrpSpPr/>
+        <p:nvPr/>
+      </p:nvGrpSpPr>
+      <p:grpSpPr>
+        <a:xfrm>
+          <a:off x="0" y="0"/>
+          <a:ext cx="0" cy="0"/>
+          <a:chOff x="0" y="0"/>
+          <a:chExt cx="0" cy="0"/>
+        </a:xfrm>
+      </p:grpSpPr>
+      <p:sp>
+        <p:nvSpPr>
+          <p:cNvPr id="2" name="Title 1"/>
+          <p:cNvSpPr>
+            <a:spLocks noGrp="1"/>
+          </p:cNvSpPr>
+          <p:nvPr>
+            <p:ph type="title"/>
+          </p:nvPr>
+        </p:nvSpPr>
+        <p:spPr/>
+        <p:txBody>
+          <a:bodyPr/>
+          <a:lstStyle/>
+          <a:p>
+            <a:r>
+              <a:rPr lang="pt-BR" dirty="0" smtClean="0"/>
+              <a:t>Protótipos de alta fidelidade</a:t>
+            </a:r>
+            <a:endParaRPr lang="pt-BR" dirty="0"/>
+          </a:p>
+        </p:txBody>
+      </p:sp>
+      <p:pic>
+        <p:nvPicPr>
+          <p:cNvPr id="4" name="Espaço Reservado para Conteúdo 3" descr="C:\Documents and Settings\User\Configurações locais\Temp\Rar$DI11.5094\Alta_Login.png"/>
+          <p:cNvPicPr>
+            <a:picLocks noGrp="1"/>
+          </p:cNvPicPr>
+          <p:nvPr>
+            <p:ph idx="1"/>
+          </p:nvPr>
+        </p:nvPicPr>
+        <p:blipFill>
+          <a:blip r:embed="rId2" cstate="print"/>
+          <a:srcRect/>
+          <a:stretch>
+            <a:fillRect/>
+          </a:stretch>
+        </p:blipFill>
+        <p:spPr bwMode="auto">
+          <a:xfrm>
+            <a:off x="611560" y="1556792"/>
+            <a:ext cx="7992887" cy="4853136"/>
+          </a:xfrm>
+          <a:prstGeom prst="rect">
+            <a:avLst/>
+          </a:prstGeom>
+          <a:noFill/>
+          <a:ln w="9525">
+            <a:solidFill>
+              <a:schemeClr val="accent1"/>
+            </a:solidFill>
+            <a:miter lim="800000"/>
+            <a:headEnd/>
+            <a:tailEnd/>
+          </a:ln>
+        </p:spPr>
+      </p:pic>
+    </p:spTree>
+    <p:extLst>
+      <p:ext uri="{BB962C8B-B14F-4D97-AF65-F5344CB8AC3E}">
+        <p14:creationId xmlns="" xmlns:p14="http://schemas.microsoft.com/office/powerpoint/2010/main" val="2991806747"/>
+      </p:ext>
+    </p:extLst>
+  </p:cSld>
+  <p:clrMapOvr>
+    <a:masterClrMapping/>
+  </p:clrMapOvr>
+  <p:timing>
+    <p:tnLst>
+      <p:par>
+        <p:cTn id="1" dur="indefinite" restart="never" nodeType="tmRoot"/>
+      </p:par>
+    </p:tnLst>
+  </p:timing>
+</p:sld>
+</file>
+
 <file path=ppt/slides/slide3.xml><?xml version="1.0" encoding="utf-8"?>
 <p:sld xmlns:a="http://schemas.openxmlformats.org/drawingml/2006/main" xmlns:r="http://schemas.openxmlformats.org/officeDocument/2006/relationships" xmlns:p="http://schemas.openxmlformats.org/presentationml/2006/main">
   <p:cSld>
@@ -8874,7 +8603,7 @@
             <a:pPr algn="just"/>
             <a:r>
               <a:rPr lang="pt-BR" dirty="0" smtClean="0"/>
-              <a:t>Os professores têm muitos afazeres e atividades a serem realizadas. Com esse excesso de serviço, muitos professores não conseguem ter um controle satisfatório do processo de ensino de cada aluno.</a:t>
+              <a:t>Os professores têm muitos afazeres e atividades a serem realizadas, complicando o controle satisfatório do processo de ensino de cada aluno.</a:t>
             </a:r>
             <a:endParaRPr lang="pt-BR" dirty="0"/>
           </a:p>
@@ -8897,8 +8626,9 @@
           <a:p>
             <a:r>
               <a:rPr lang="pt-BR" dirty="0" smtClean="0"/>
-              <a:t>29/09/2014</a:t>
-            </a:r>
+              <a:t>05/12/2014</a:t>
+            </a:r>
+            <a:endParaRPr lang="pt-BR" dirty="0" smtClean="0"/>
           </a:p>
           <a:p>
             <a:endParaRPr lang="pt-BR" dirty="0"/>
@@ -9103,7 +8833,7 @@
           <a:p>
             <a:r>
               <a:rPr lang="pt-BR" dirty="0" smtClean="0"/>
-              <a:t>Protótipos de baixa fidelidade</a:t>
+              <a:t>Protótipos de alta fidelidade</a:t>
             </a:r>
             <a:endParaRPr lang="pt-BR" dirty="0"/>
           </a:p>
@@ -9111,7 +8841,7 @@
       </p:sp>
       <p:pic>
         <p:nvPicPr>
-          <p:cNvPr id="6" name="Espaço Reservado para Conteúdo 5" descr="C:\Documents and Settings\User\Configurações locais\Temp\Rar$DI15.5922\Baixa_Home_Aluno.png"/>
+          <p:cNvPr id="6" name="Espaço Reservado para Conteúdo 5" descr="C:\Documents and Settings\User\Meus documentos\Downloads\Alta_Home_Professor.png"/>
           <p:cNvPicPr>
             <a:picLocks noGrp="1"/>
           </p:cNvPicPr>
@@ -9128,15 +8858,17 @@
         </p:blipFill>
         <p:spPr bwMode="auto">
           <a:xfrm>
-            <a:off x="971600" y="1772817"/>
-            <a:ext cx="7128792" cy="4608512"/>
+            <a:off x="611560" y="1700808"/>
+            <a:ext cx="7992888" cy="4752528"/>
           </a:xfrm>
           <a:prstGeom prst="rect">
             <a:avLst/>
           </a:prstGeom>
           <a:noFill/>
           <a:ln w="9525">
-            <a:noFill/>
+            <a:solidFill>
+              <a:schemeClr val="accent1"/>
+            </a:solidFill>
             <a:miter lim="800000"/>
             <a:headEnd/>
             <a:tailEnd/>
@@ -9197,7 +8929,7 @@
           <a:p>
             <a:r>
               <a:rPr lang="pt-BR" dirty="0" smtClean="0"/>
-              <a:t>Protótipos de alta fidelidade</a:t>
+              <a:t>Protótipos de baixa fidelidade</a:t>
             </a:r>
             <a:endParaRPr lang="pt-BR" dirty="0"/>
           </a:p>
@@ -9205,7 +8937,7 @@
       </p:sp>
       <p:pic>
         <p:nvPicPr>
-          <p:cNvPr id="4" name="Espaço Reservado para Conteúdo 3" descr="C:\Documents and Settings\User\Configurações locais\Temp\Rar$DI11.5094\Alta_Login.png"/>
+          <p:cNvPr id="6" name="Espaço Reservado para Conteúdo 5" descr="C:\Documents and Settings\User\Configurações locais\Temp\Rar$DI15.5922\Baixa_Home_Aluno.png"/>
           <p:cNvPicPr>
             <a:picLocks noGrp="1"/>
           </p:cNvPicPr>
@@ -9222,17 +8954,15 @@
         </p:blipFill>
         <p:spPr bwMode="auto">
           <a:xfrm>
-            <a:off x="611560" y="1556792"/>
-            <a:ext cx="7992887" cy="4853136"/>
+            <a:off x="971600" y="1772817"/>
+            <a:ext cx="7128792" cy="4608512"/>
           </a:xfrm>
           <a:prstGeom prst="rect">
             <a:avLst/>
           </a:prstGeom>
           <a:noFill/>
           <a:ln w="9525">
-            <a:solidFill>
-              <a:schemeClr val="accent1"/>
-            </a:solidFill>
+            <a:noFill/>
             <a:miter lim="800000"/>
             <a:headEnd/>
             <a:tailEnd/>
@@ -9389,52 +9119,97 @@
           <a:p>
             <a:r>
               <a:rPr lang="pt-BR" dirty="0" smtClean="0"/>
-              <a:t>Protótipos de alta fidelidade</a:t>
-            </a:r>
-            <a:endParaRPr lang="pt-BR" dirty="0"/>
-          </a:p>
-        </p:txBody>
-      </p:sp>
-      <p:pic>
-        <p:nvPicPr>
-          <p:cNvPr id="6" name="Espaço Reservado para Conteúdo 5" descr="C:\Documents and Settings\User\Meus documentos\Downloads\Alta_Home_Professor.png"/>
-          <p:cNvPicPr>
-            <a:picLocks noGrp="1"/>
-          </p:cNvPicPr>
+              <a:t>Arquitetura do Software</a:t>
+            </a:r>
+            <a:endParaRPr lang="pt-BR" dirty="0"/>
+          </a:p>
+        </p:txBody>
+      </p:sp>
+      <p:sp>
+        <p:nvSpPr>
+          <p:cNvPr id="3" name="Content Placeholder 2"/>
+          <p:cNvSpPr>
+            <a:spLocks noGrp="1"/>
+          </p:cNvSpPr>
           <p:nvPr>
             <p:ph idx="1"/>
           </p:nvPr>
-        </p:nvPicPr>
-        <p:blipFill>
-          <a:blip r:embed="rId2" cstate="print"/>
-          <a:srcRect/>
-          <a:stretch>
-            <a:fillRect/>
-          </a:stretch>
-        </p:blipFill>
-        <p:spPr bwMode="auto">
-          <a:xfrm>
-            <a:off x="611560" y="1700808"/>
-            <a:ext cx="7992888" cy="4752528"/>
-          </a:xfrm>
-          <a:prstGeom prst="rect">
-            <a:avLst/>
-          </a:prstGeom>
-          <a:noFill/>
-          <a:ln w="9525">
-            <a:solidFill>
-              <a:schemeClr val="accent1"/>
-            </a:solidFill>
-            <a:miter lim="800000"/>
-            <a:headEnd/>
-            <a:tailEnd/>
-          </a:ln>
-        </p:spPr>
-      </p:pic>
+        </p:nvSpPr>
+        <p:spPr/>
+        <p:txBody>
+          <a:bodyPr>
+            <a:normAutofit lnSpcReduction="10000"/>
+          </a:bodyPr>
+          <a:lstStyle/>
+          <a:p>
+            <a:r>
+              <a:rPr lang="pt-BR" dirty="0" smtClean="0"/>
+              <a:t>Os itens são agrupados por pacotes, segundo critérios funcionais de negócio. Os padrões utilizados são estruturais e comportamentais.</a:t>
+            </a:r>
+          </a:p>
+          <a:p>
+            <a:pPr>
+              <a:buNone/>
+            </a:pPr>
+            <a:endParaRPr lang="pt-BR" dirty="0" smtClean="0"/>
+          </a:p>
+          <a:p>
+            <a:pPr>
+              <a:buNone/>
+            </a:pPr>
+            <a:r>
+              <a:rPr lang="pt-BR" dirty="0" smtClean="0"/>
+              <a:t>    - Estamos utilizando o framework </a:t>
+            </a:r>
+            <a:r>
+              <a:rPr lang="pt-BR" dirty="0" err="1" smtClean="0"/>
+              <a:t>Bootstrap</a:t>
+            </a:r>
+            <a:r>
+              <a:rPr lang="pt-BR" dirty="0" smtClean="0"/>
+              <a:t>, para criação de páginas Web.- Camada Cliente </a:t>
+            </a:r>
+          </a:p>
+          <a:p>
+            <a:pPr>
+              <a:buNone/>
+            </a:pPr>
+            <a:r>
+              <a:rPr lang="pt-BR" dirty="0" smtClean="0"/>
+              <a:t>    - Páginas em Java </a:t>
+            </a:r>
+            <a:r>
+              <a:rPr lang="pt-BR" dirty="0" err="1" smtClean="0"/>
+              <a:t>Servlets</a:t>
+            </a:r>
+            <a:r>
+              <a:rPr lang="pt-BR" dirty="0" smtClean="0"/>
+              <a:t>, com camada de visualização JSP e uso do </a:t>
+            </a:r>
+            <a:r>
+              <a:rPr lang="pt-BR" dirty="0" err="1" smtClean="0"/>
+              <a:t>JavaScript</a:t>
+            </a:r>
+            <a:r>
+              <a:rPr lang="pt-BR" dirty="0" smtClean="0"/>
+              <a:t> para validação de campos, </a:t>
+            </a:r>
+          </a:p>
+          <a:p>
+            <a:pPr>
+              <a:buNone/>
+            </a:pPr>
+            <a:r>
+              <a:rPr lang="pt-BR" dirty="0" smtClean="0"/>
+              <a:t>    - DAOS e VO para acesso a camada de dados.</a:t>
+            </a:r>
+          </a:p>
+        </p:txBody>
+      </p:sp>
     </p:spTree>
     <p:extLst>
       <p:ext uri="{BB962C8B-B14F-4D97-AF65-F5344CB8AC3E}">
-        <p14:creationId xmlns="" xmlns:p14="http://schemas.microsoft.com/office/powerpoint/2010/main" val="2991806747"/>
+        <p14:creationId xmlns="" xmlns:p14="http://schemas.microsoft.com/office/powerpoint/2010/main" val="2341494487"/>
       </p:ext>
     </p:extLst>
   </p:cSld>
@@ -9504,19 +9279,9 @@
         <p:spPr/>
         <p:txBody>
           <a:bodyPr>
-            <a:normAutofit fontScale="92500" lnSpcReduction="20000"/>
+            <a:normAutofit/>
           </a:bodyPr>
           <a:lstStyle/>
-          <a:p>
-            <a:r>
-              <a:rPr lang="pt-BR" dirty="0" smtClean="0"/>
-              <a:t>Os itens são agrupados por pacotes, segundo critérios funcionais de negócio. Os padrões utilizados são estruturais e comportamentais</a:t>
-            </a:r>
-            <a:r>
-              <a:rPr lang="pt-BR" dirty="0" smtClean="0"/>
-              <a:t>.</a:t>
-            </a:r>
-          </a:p>
           <a:p>
             <a:pPr>
               <a:buNone/>
@@ -9524,58 +9289,97 @@
             <a:endParaRPr lang="pt-BR" dirty="0" smtClean="0"/>
           </a:p>
           <a:p>
-            <a:r>
-              <a:rPr lang="pt-BR" dirty="0" smtClean="0"/>
-              <a:t> As decisões de projeto tomadas são Caso de Negócio, Avaliação de Iteração, Plano de Iteração, Registro de Revisão, Lista de Riscos e Avaliação de </a:t>
-            </a:r>
-            <a:r>
-              <a:rPr lang="pt-BR" dirty="0" smtClean="0"/>
-              <a:t>Status.</a:t>
-            </a:r>
-          </a:p>
-          <a:p>
             <a:pPr>
               <a:buNone/>
             </a:pPr>
             <a:endParaRPr lang="pt-BR" dirty="0" smtClean="0"/>
           </a:p>
-          <a:p>
-            <a:r>
-              <a:rPr lang="pt-BR" dirty="0" smtClean="0"/>
-              <a:t> Estamos utilizando o framework </a:t>
-            </a:r>
+        </p:txBody>
+      </p:sp>
+      <p:sp>
+        <p:nvSpPr>
+          <p:cNvPr id="4" name="Retângulo 3"/>
+          <p:cNvSpPr/>
+          <p:nvPr/>
+        </p:nvSpPr>
+        <p:spPr>
+          <a:xfrm>
+            <a:off x="3998766" y="3244334"/>
+            <a:ext cx="1146468" cy="369332"/>
+          </a:xfrm>
+          <a:prstGeom prst="rect">
+            <a:avLst/>
+          </a:prstGeom>
+        </p:spPr>
+        <p:txBody>
+          <a:bodyPr wrap="none">
+            <a:spAutoFit/>
+          </a:bodyPr>
+          <a:lstStyle/>
+          <a:p>
             <a:r>
               <a:rPr lang="pt-BR" dirty="0" err="1" smtClean="0"/>
-              <a:t>Struts</a:t>
-            </a:r>
-            <a:r>
-              <a:rPr lang="pt-BR" dirty="0" smtClean="0"/>
-              <a:t>, que engloba a Java </a:t>
-            </a:r>
+              <a:t>bootstrap</a:t>
+            </a:r>
+            <a:endParaRPr lang="pt-BR" dirty="0"/>
+          </a:p>
+        </p:txBody>
+      </p:sp>
+      <p:sp>
+        <p:nvSpPr>
+          <p:cNvPr id="5" name="Retângulo 4"/>
+          <p:cNvSpPr/>
+          <p:nvPr/>
+        </p:nvSpPr>
+        <p:spPr>
+          <a:xfrm>
+            <a:off x="3998766" y="3244334"/>
+            <a:ext cx="1146468" cy="369332"/>
+          </a:xfrm>
+          <a:prstGeom prst="rect">
+            <a:avLst/>
+          </a:prstGeom>
+        </p:spPr>
+        <p:txBody>
+          <a:bodyPr wrap="none">
+            <a:spAutoFit/>
+          </a:bodyPr>
+          <a:lstStyle/>
+          <a:p>
             <a:r>
               <a:rPr lang="pt-BR" dirty="0" err="1" smtClean="0"/>
-              <a:t>Servlets</a:t>
-            </a:r>
-            <a:r>
-              <a:rPr lang="pt-BR" dirty="0" smtClean="0"/>
-              <a:t> com a camada de visualização JSP e uso do </a:t>
-            </a:r>
-            <a:r>
-              <a:rPr lang="pt-BR" dirty="0" err="1" smtClean="0"/>
-              <a:t>JavaScript</a:t>
-            </a:r>
-            <a:r>
-              <a:rPr lang="pt-BR" dirty="0" smtClean="0"/>
-              <a:t> para validação de campos</a:t>
-            </a:r>
-            <a:r>
-              <a:rPr lang="pt-BR" dirty="0" smtClean="0"/>
-              <a:t>.</a:t>
-            </a:r>
-            <a:endParaRPr lang="pt-BR" dirty="0" smtClean="0"/>
-          </a:p>
-        </p:txBody>
-      </p:sp>
+              <a:t>bootstrap</a:t>
+            </a:r>
+            <a:endParaRPr lang="pt-BR" dirty="0"/>
+          </a:p>
+        </p:txBody>
+      </p:sp>
+      <p:pic>
+        <p:nvPicPr>
+          <p:cNvPr id="1026" name="Picture 2" descr="Camadas numa aplicação J2EE"/>
+          <p:cNvPicPr>
+            <a:picLocks noChangeAspect="1" noChangeArrowheads="1"/>
+          </p:cNvPicPr>
+          <p:nvPr/>
+        </p:nvPicPr>
+        <p:blipFill>
+          <a:blip r:embed="rId2" cstate="print"/>
+          <a:srcRect/>
+          <a:stretch>
+            <a:fillRect/>
+          </a:stretch>
+        </p:blipFill>
+        <p:spPr bwMode="auto">
+          <a:xfrm>
+            <a:off x="2699792" y="1476247"/>
+            <a:ext cx="4199756" cy="4870851"/>
+          </a:xfrm>
+          <a:prstGeom prst="rect">
+            <a:avLst/>
+          </a:prstGeom>
+          <a:noFill/>
+        </p:spPr>
+      </p:pic>
     </p:spTree>
     <p:extLst>
       <p:ext uri="{BB962C8B-B14F-4D97-AF65-F5344CB8AC3E}">
@@ -9634,7 +9438,7 @@
       </p:sp>
       <p:pic>
         <p:nvPicPr>
-          <p:cNvPr id="7" name="Imagem 6" descr="BoletimVisualiza.png"/>
+          <p:cNvPr id="4" name="Imagem 3" descr="BOLETIMInsere.png"/>
           <p:cNvPicPr/>
           <p:nvPr/>
         </p:nvPicPr>
@@ -9646,8 +9450,8 @@
         </p:blipFill>
         <p:spPr>
           <a:xfrm>
-            <a:off x="539552" y="260648"/>
-            <a:ext cx="8424935" cy="6597352"/>
+            <a:off x="395536" y="188640"/>
+            <a:ext cx="8748463" cy="6480719"/>
           </a:xfrm>
           <a:prstGeom prst="rect">
             <a:avLst/>
@@ -9726,37 +9530,239 @@
             <p:ph idx="1"/>
           </p:nvPr>
         </p:nvSpPr>
-        <p:spPr/>
+        <p:spPr>
+          <a:xfrm>
+            <a:off x="457200" y="1600200"/>
+            <a:ext cx="4258816" cy="4853136"/>
+          </a:xfrm>
+        </p:spPr>
         <p:txBody>
           <a:bodyPr>
+            <a:normAutofit lnSpcReduction="10000"/>
+          </a:bodyPr>
+          <a:lstStyle/>
+          <a:p>
+            <a:pPr>
+              <a:buNone/>
+            </a:pPr>
+            <a:r>
+              <a:rPr lang="pt-BR" dirty="0" smtClean="0"/>
+              <a:t>     Ao salvar o boletim, o sistema não permite imprimir o documento. </a:t>
+            </a:r>
+          </a:p>
+          <a:p>
+            <a:pPr>
+              <a:buFont typeface="Wingdings" pitchFamily="2" charset="2"/>
+              <a:buChar char="ü"/>
+            </a:pPr>
+            <a:r>
+              <a:rPr lang="pt-BR" dirty="0" smtClean="0"/>
+              <a:t>Inserir  função: gerar </a:t>
+            </a:r>
+            <a:r>
+              <a:rPr lang="pt-BR" dirty="0" err="1" smtClean="0"/>
+              <a:t>pdf</a:t>
+            </a:r>
+            <a:endParaRPr lang="pt-BR" dirty="0" smtClean="0"/>
+          </a:p>
+          <a:p>
+            <a:pPr>
+              <a:buNone/>
+            </a:pPr>
+            <a:endParaRPr lang="pt-BR" dirty="0" smtClean="0"/>
+          </a:p>
+          <a:p>
+            <a:pPr>
+              <a:buNone/>
+            </a:pPr>
+            <a:r>
+              <a:rPr lang="pt-BR" dirty="0" smtClean="0"/>
+              <a:t>    Ao inserir uma nota com casa decimal, não há mensagem de erro ao usuário.</a:t>
+            </a:r>
+          </a:p>
+          <a:p>
+            <a:pPr>
+              <a:buFont typeface="Wingdings" pitchFamily="2" charset="2"/>
+              <a:buChar char="ü"/>
+            </a:pPr>
+            <a:r>
+              <a:rPr lang="en-US" dirty="0" err="1" smtClean="0"/>
+              <a:t>Adicionar</a:t>
+            </a:r>
+            <a:r>
+              <a:rPr lang="en-US" dirty="0" smtClean="0"/>
+              <a:t> msn </a:t>
+            </a:r>
+            <a:r>
+              <a:rPr lang="en-US" dirty="0" err="1" smtClean="0"/>
+              <a:t>corretiva</a:t>
+            </a:r>
+            <a:endParaRPr lang="pt-BR" dirty="0" smtClean="0"/>
+          </a:p>
+          <a:p>
+            <a:pPr>
+              <a:buNone/>
+            </a:pPr>
+            <a:endParaRPr lang="pt-BR" dirty="0"/>
+          </a:p>
+        </p:txBody>
+      </p:sp>
+      <p:sp>
+        <p:nvSpPr>
+          <p:cNvPr id="4" name="Espaço Reservado para Conteúdo 2"/>
+          <p:cNvSpPr txBox="1">
+            <a:spLocks/>
+          </p:cNvSpPr>
+          <p:nvPr/>
+        </p:nvSpPr>
+        <p:spPr bwMode="auto">
+          <a:xfrm>
+            <a:off x="5004048" y="1700808"/>
+            <a:ext cx="3610744" cy="4530725"/>
+          </a:xfrm>
+          <a:prstGeom prst="rect">
+            <a:avLst/>
+          </a:prstGeom>
+          <a:noFill/>
+          <a:ln w="9525">
+            <a:noFill/>
+            <a:miter lim="800000"/>
+            <a:headEnd/>
+            <a:tailEnd/>
+          </a:ln>
+          <a:effectLst/>
+        </p:spPr>
+        <p:txBody>
+          <a:bodyPr vert="horz" wrap="square" lIns="91440" tIns="45720" rIns="91440" bIns="45720" numCol="1" anchor="t" anchorCtr="0" compatLnSpc="1">
+            <a:prstTxWarp prst="textNoShape">
+              <a:avLst/>
+            </a:prstTxWarp>
             <a:normAutofit/>
           </a:bodyPr>
           <a:lstStyle/>
           <a:p>
-            <a:r>
-              <a:rPr lang="pt-BR" dirty="0" smtClean="0"/>
-              <a:t>Descrever os resultados da inspeção de usabilidade.</a:t>
-            </a:r>
-          </a:p>
-          <a:p>
-            <a:r>
-              <a:rPr lang="pt-BR" dirty="0" smtClean="0"/>
-              <a:t>No caso de terem sido usadas heurísticas, citar as heurísticas utilizadas.</a:t>
-            </a:r>
-          </a:p>
-          <a:p>
-            <a:endParaRPr lang="pt-BR" dirty="0"/>
-          </a:p>
-          <a:p>
-            <a:r>
-              <a:rPr lang="pt-BR" dirty="0"/>
-              <a:t>Máximo 2 </a:t>
-            </a:r>
-            <a:r>
-              <a:rPr lang="pt-BR" dirty="0" smtClean="0"/>
-              <a:t>slides</a:t>
-            </a:r>
-            <a:endParaRPr lang="pt-BR" dirty="0"/>
+            <a:pPr marL="342900" lvl="0" indent="-342900" eaLnBrk="1" hangingPunct="1">
+              <a:spcBef>
+                <a:spcPct val="20000"/>
+              </a:spcBef>
+              <a:buClr>
+                <a:schemeClr val="bg2"/>
+              </a:buClr>
+              <a:buSzPct val="75000"/>
+              <a:defRPr/>
+            </a:pPr>
+            <a:r>
+              <a:rPr kumimoji="0" lang="pt-BR" sz="2800" b="0" i="0" u="none" strike="noStrike" kern="0" cap="none" spc="0" normalizeH="0" baseline="0" noProof="0" dirty="0" smtClean="0">
+                <a:ln>
+                  <a:noFill/>
+                </a:ln>
+                <a:solidFill>
+                  <a:schemeClr val="tx1"/>
+                </a:solidFill>
+                <a:effectLst/>
+                <a:uLnTx/>
+                <a:uFillTx/>
+                <a:latin typeface="+mn-lt"/>
+                <a:ea typeface="+mn-ea"/>
+                <a:cs typeface="+mn-cs"/>
+              </a:rPr>
+              <a:t>     </a:t>
+            </a:r>
+            <a:r>
+              <a:rPr lang="pt-BR" sz="2800" kern="0" dirty="0" smtClean="0"/>
+              <a:t>Heurística:   3</a:t>
+            </a:r>
+          </a:p>
+          <a:p>
+            <a:pPr marL="342900" lvl="0" indent="-342900" eaLnBrk="1" hangingPunct="1">
+              <a:spcBef>
+                <a:spcPct val="20000"/>
+              </a:spcBef>
+              <a:buClr>
+                <a:schemeClr val="bg2"/>
+              </a:buClr>
+              <a:buSzPct val="75000"/>
+              <a:defRPr/>
+            </a:pPr>
+            <a:r>
+              <a:rPr lang="pt-BR" sz="2800" kern="0" dirty="0" smtClean="0"/>
+              <a:t>     Severidade: 2 </a:t>
+            </a:r>
+          </a:p>
+          <a:p>
+            <a:pPr marL="342900" lvl="0" indent="-342900" eaLnBrk="1" hangingPunct="1">
+              <a:spcBef>
+                <a:spcPct val="20000"/>
+              </a:spcBef>
+              <a:buClr>
+                <a:schemeClr val="bg2"/>
+              </a:buClr>
+              <a:buSzPct val="75000"/>
+              <a:defRPr/>
+            </a:pPr>
+            <a:endParaRPr lang="pt-BR" sz="2800" kern="0" dirty="0" smtClean="0"/>
+          </a:p>
+          <a:p>
+            <a:pPr marL="342900" lvl="0" indent="-342900" eaLnBrk="1" hangingPunct="1">
+              <a:spcBef>
+                <a:spcPct val="20000"/>
+              </a:spcBef>
+              <a:buClr>
+                <a:schemeClr val="bg2"/>
+              </a:buClr>
+              <a:buSzPct val="75000"/>
+              <a:defRPr/>
+            </a:pPr>
+            <a:endParaRPr lang="pt-BR" sz="2800" kern="0" dirty="0" smtClean="0"/>
+          </a:p>
+          <a:p>
+            <a:pPr marL="342900" lvl="0" indent="-342900" eaLnBrk="1" hangingPunct="1">
+              <a:spcBef>
+                <a:spcPct val="20000"/>
+              </a:spcBef>
+              <a:buClr>
+                <a:schemeClr val="bg2"/>
+              </a:buClr>
+              <a:buSzPct val="75000"/>
+              <a:defRPr/>
+            </a:pPr>
+            <a:r>
+              <a:rPr lang="en-US" sz="2800" kern="0" dirty="0" smtClean="0"/>
+              <a:t>  </a:t>
+            </a:r>
+            <a:endParaRPr lang="pt-BR" sz="2800" kern="0" dirty="0" smtClean="0"/>
+          </a:p>
+          <a:p>
+            <a:pPr marL="342900" lvl="0" indent="-342900" eaLnBrk="1" hangingPunct="1">
+              <a:spcBef>
+                <a:spcPct val="20000"/>
+              </a:spcBef>
+              <a:buClr>
+                <a:schemeClr val="bg2"/>
+              </a:buClr>
+              <a:buSzPct val="75000"/>
+              <a:defRPr/>
+            </a:pPr>
+            <a:r>
+              <a:rPr lang="pt-BR" sz="2800" kern="0" dirty="0" smtClean="0"/>
+              <a:t>      Heurística:  1</a:t>
+            </a:r>
+          </a:p>
+          <a:p>
+            <a:pPr marL="342900" lvl="0" indent="-342900" eaLnBrk="1" hangingPunct="1">
+              <a:spcBef>
+                <a:spcPct val="20000"/>
+              </a:spcBef>
+              <a:buClr>
+                <a:schemeClr val="bg2"/>
+              </a:buClr>
+              <a:buSzPct val="75000"/>
+              <a:defRPr/>
+            </a:pPr>
+            <a:r>
+              <a:rPr lang="pt-BR" sz="2800" kern="0" dirty="0" smtClean="0"/>
+              <a:t>     Severidade: 3 </a:t>
+            </a:r>
           </a:p>
         </p:txBody>
       </p:sp>
@@ -9799,6 +9805,325 @@
       </p:grpSpPr>
       <p:sp>
         <p:nvSpPr>
+          <p:cNvPr id="2" name="Título 1"/>
+          <p:cNvSpPr>
+            <a:spLocks noGrp="1"/>
+          </p:cNvSpPr>
+          <p:nvPr>
+            <p:ph type="title"/>
+          </p:nvPr>
+        </p:nvSpPr>
+        <p:spPr/>
+        <p:txBody>
+          <a:bodyPr>
+            <a:normAutofit/>
+          </a:bodyPr>
+          <a:lstStyle/>
+          <a:p>
+            <a:r>
+              <a:rPr lang="pt-BR" dirty="0" smtClean="0"/>
+              <a:t>Inspeção de Usabilidade</a:t>
+            </a:r>
+            <a:endParaRPr lang="pt-BR" dirty="0"/>
+          </a:p>
+        </p:txBody>
+      </p:sp>
+      <p:sp>
+        <p:nvSpPr>
+          <p:cNvPr id="3" name="Espaço Reservado para Conteúdo 2"/>
+          <p:cNvSpPr>
+            <a:spLocks noGrp="1"/>
+          </p:cNvSpPr>
+          <p:nvPr>
+            <p:ph idx="1"/>
+          </p:nvPr>
+        </p:nvSpPr>
+        <p:spPr>
+          <a:xfrm>
+            <a:off x="457200" y="1600200"/>
+            <a:ext cx="4762872" cy="4853136"/>
+          </a:xfrm>
+        </p:spPr>
+        <p:txBody>
+          <a:bodyPr>
+            <a:normAutofit/>
+          </a:bodyPr>
+          <a:lstStyle/>
+          <a:p>
+            <a:pPr>
+              <a:buNone/>
+            </a:pPr>
+            <a:r>
+              <a:rPr lang="pt-BR" dirty="0" smtClean="0"/>
+              <a:t>    Nas etapas de finalização de edição de nota e falta não há possibilidade de voltar. </a:t>
+            </a:r>
+          </a:p>
+          <a:p>
+            <a:pPr>
+              <a:buFont typeface="Wingdings" pitchFamily="2" charset="2"/>
+              <a:buChar char="ü"/>
+            </a:pPr>
+            <a:r>
+              <a:rPr lang="pt-BR" dirty="0" smtClean="0"/>
+              <a:t>Adicionar links de voltar</a:t>
+            </a:r>
+          </a:p>
+          <a:p>
+            <a:pPr>
+              <a:buNone/>
+            </a:pPr>
+            <a:endParaRPr lang="pt-BR" dirty="0" smtClean="0"/>
+          </a:p>
+          <a:p>
+            <a:pPr>
+              <a:buNone/>
+            </a:pPr>
+            <a:r>
+              <a:rPr lang="pt-BR" dirty="0" smtClean="0"/>
+              <a:t>    </a:t>
+            </a:r>
+            <a:r>
+              <a:rPr lang="pt-BR" dirty="0" err="1" smtClean="0"/>
+              <a:t>Login</a:t>
+            </a:r>
+            <a:r>
+              <a:rPr lang="pt-BR" dirty="0" smtClean="0"/>
+              <a:t> não oferece link para relembrar a senha</a:t>
+            </a:r>
+          </a:p>
+          <a:p>
+            <a:pPr>
+              <a:buFont typeface="Wingdings" pitchFamily="2" charset="2"/>
+              <a:buChar char="ü"/>
+            </a:pPr>
+            <a:r>
+              <a:rPr lang="en-US" dirty="0" err="1" smtClean="0"/>
+              <a:t>Adicionar</a:t>
+            </a:r>
+            <a:r>
+              <a:rPr lang="en-US" dirty="0" smtClean="0"/>
+              <a:t> link</a:t>
+            </a:r>
+            <a:endParaRPr lang="pt-BR" dirty="0" smtClean="0"/>
+          </a:p>
+          <a:p>
+            <a:pPr>
+              <a:buNone/>
+            </a:pPr>
+            <a:endParaRPr lang="pt-BR" dirty="0"/>
+          </a:p>
+        </p:txBody>
+      </p:sp>
+      <p:sp>
+        <p:nvSpPr>
+          <p:cNvPr id="4" name="Espaço Reservado para Conteúdo 2"/>
+          <p:cNvSpPr txBox="1">
+            <a:spLocks/>
+          </p:cNvSpPr>
+          <p:nvPr/>
+        </p:nvSpPr>
+        <p:spPr bwMode="auto">
+          <a:xfrm>
+            <a:off x="5004048" y="1700808"/>
+            <a:ext cx="3610744" cy="4530725"/>
+          </a:xfrm>
+          <a:prstGeom prst="rect">
+            <a:avLst/>
+          </a:prstGeom>
+          <a:noFill/>
+          <a:ln w="9525">
+            <a:noFill/>
+            <a:miter lim="800000"/>
+            <a:headEnd/>
+            <a:tailEnd/>
+          </a:ln>
+          <a:effectLst/>
+        </p:spPr>
+        <p:txBody>
+          <a:bodyPr vert="horz" wrap="square" lIns="91440" tIns="45720" rIns="91440" bIns="45720" numCol="1" anchor="t" anchorCtr="0" compatLnSpc="1">
+            <a:prstTxWarp prst="textNoShape">
+              <a:avLst/>
+            </a:prstTxWarp>
+            <a:normAutofit/>
+          </a:bodyPr>
+          <a:lstStyle/>
+          <a:p>
+            <a:pPr marL="342900" lvl="0" indent="-342900" eaLnBrk="1" hangingPunct="1">
+              <a:spcBef>
+                <a:spcPct val="20000"/>
+              </a:spcBef>
+              <a:buClr>
+                <a:schemeClr val="bg2"/>
+              </a:buClr>
+              <a:buSzPct val="75000"/>
+              <a:defRPr/>
+            </a:pPr>
+            <a:r>
+              <a:rPr kumimoji="0" lang="pt-BR" sz="2800" b="0" i="0" u="none" strike="noStrike" kern="0" cap="none" spc="0" normalizeH="0" baseline="0" noProof="0" dirty="0" smtClean="0">
+                <a:ln>
+                  <a:noFill/>
+                </a:ln>
+                <a:solidFill>
+                  <a:schemeClr val="tx1"/>
+                </a:solidFill>
+                <a:effectLst/>
+                <a:uLnTx/>
+                <a:uFillTx/>
+                <a:latin typeface="+mn-lt"/>
+                <a:ea typeface="+mn-ea"/>
+                <a:cs typeface="+mn-cs"/>
+              </a:rPr>
+              <a:t>     </a:t>
+            </a:r>
+            <a:r>
+              <a:rPr lang="pt-BR" sz="2800" kern="0" dirty="0" smtClean="0"/>
+              <a:t>Heurística:   3</a:t>
+            </a:r>
+          </a:p>
+          <a:p>
+            <a:pPr marL="342900" lvl="0" indent="-342900" eaLnBrk="1" hangingPunct="1">
+              <a:spcBef>
+                <a:spcPct val="20000"/>
+              </a:spcBef>
+              <a:buClr>
+                <a:schemeClr val="bg2"/>
+              </a:buClr>
+              <a:buSzPct val="75000"/>
+              <a:defRPr/>
+            </a:pPr>
+            <a:r>
+              <a:rPr lang="pt-BR" sz="2800" kern="0" dirty="0" smtClean="0"/>
+              <a:t>     Severidade: 2 </a:t>
+            </a:r>
+          </a:p>
+          <a:p>
+            <a:pPr marL="342900" lvl="0" indent="-342900" eaLnBrk="1" hangingPunct="1">
+              <a:spcBef>
+                <a:spcPct val="20000"/>
+              </a:spcBef>
+              <a:buClr>
+                <a:schemeClr val="bg2"/>
+              </a:buClr>
+              <a:buSzPct val="75000"/>
+              <a:defRPr/>
+            </a:pPr>
+            <a:endParaRPr lang="pt-BR" sz="2800" kern="0" dirty="0" smtClean="0"/>
+          </a:p>
+          <a:p>
+            <a:pPr marL="342900" lvl="0" indent="-342900" eaLnBrk="1" hangingPunct="1">
+              <a:spcBef>
+                <a:spcPct val="20000"/>
+              </a:spcBef>
+              <a:buClr>
+                <a:schemeClr val="bg2"/>
+              </a:buClr>
+              <a:buSzPct val="75000"/>
+              <a:defRPr/>
+            </a:pPr>
+            <a:endParaRPr lang="pt-BR" sz="2800" kern="0" dirty="0" smtClean="0"/>
+          </a:p>
+          <a:p>
+            <a:pPr marL="342900" lvl="0" indent="-342900" eaLnBrk="1" hangingPunct="1">
+              <a:spcBef>
+                <a:spcPct val="20000"/>
+              </a:spcBef>
+              <a:buClr>
+                <a:schemeClr val="bg2"/>
+              </a:buClr>
+              <a:buSzPct val="75000"/>
+              <a:defRPr/>
+            </a:pPr>
+            <a:r>
+              <a:rPr lang="en-US" sz="2800" kern="0" dirty="0" smtClean="0"/>
+              <a:t>  </a:t>
+            </a:r>
+          </a:p>
+          <a:p>
+            <a:pPr marL="342900" lvl="0" indent="-342900" eaLnBrk="1" hangingPunct="1">
+              <a:spcBef>
+                <a:spcPct val="20000"/>
+              </a:spcBef>
+              <a:buClr>
+                <a:schemeClr val="bg2"/>
+              </a:buClr>
+              <a:buSzPct val="75000"/>
+              <a:defRPr/>
+            </a:pPr>
+            <a:endParaRPr lang="pt-BR" sz="2800" kern="0" dirty="0" smtClean="0"/>
+          </a:p>
+          <a:p>
+            <a:pPr marL="342900" lvl="0" indent="-342900" eaLnBrk="1" hangingPunct="1">
+              <a:spcBef>
+                <a:spcPct val="20000"/>
+              </a:spcBef>
+              <a:buClr>
+                <a:schemeClr val="bg2"/>
+              </a:buClr>
+              <a:buSzPct val="75000"/>
+              <a:defRPr/>
+            </a:pPr>
+            <a:r>
+              <a:rPr lang="pt-BR" sz="2800" kern="0" dirty="0" smtClean="0"/>
+              <a:t>      Heurística:  5</a:t>
+            </a:r>
+          </a:p>
+          <a:p>
+            <a:pPr marL="342900" lvl="0" indent="-342900" eaLnBrk="1" hangingPunct="1">
+              <a:spcBef>
+                <a:spcPct val="20000"/>
+              </a:spcBef>
+              <a:buClr>
+                <a:schemeClr val="bg2"/>
+              </a:buClr>
+              <a:buSzPct val="75000"/>
+              <a:defRPr/>
+            </a:pPr>
+            <a:r>
+              <a:rPr lang="pt-BR" sz="2800" kern="0" dirty="0" smtClean="0"/>
+              <a:t>     Severidade: 3 </a:t>
+            </a:r>
+          </a:p>
+        </p:txBody>
+      </p:sp>
+    </p:spTree>
+    <p:extLst>
+      <p:ext uri="{BB962C8B-B14F-4D97-AF65-F5344CB8AC3E}">
+        <p14:creationId xmlns="" xmlns:p14="http://schemas.microsoft.com/office/powerpoint/2010/main" val="403771080"/>
+      </p:ext>
+    </p:extLst>
+  </p:cSld>
+  <p:clrMapOvr>
+    <a:masterClrMapping/>
+  </p:clrMapOvr>
+  <p:timing>
+    <p:tnLst>
+      <p:par>
+        <p:cTn id="1" dur="indefinite" restart="never" nodeType="tmRoot"/>
+      </p:par>
+    </p:tnLst>
+  </p:timing>
+</p:sld>
+</file>
+
+<file path=ppt/slides/slide39.xml><?xml version="1.0" encoding="utf-8"?>
+<p:sld xmlns:a="http://schemas.openxmlformats.org/drawingml/2006/main" xmlns:r="http://schemas.openxmlformats.org/officeDocument/2006/relationships" xmlns:p="http://schemas.openxmlformats.org/presentationml/2006/main">
+  <p:cSld>
+    <p:spTree>
+      <p:nvGrpSpPr>
+        <p:cNvPr id="1" name=""/>
+        <p:cNvGrpSpPr/>
+        <p:nvPr/>
+      </p:nvGrpSpPr>
+      <p:grpSpPr>
+        <a:xfrm>
+          <a:off x="0" y="0"/>
+          <a:ext cx="0" cy="0"/>
+          <a:chOff x="0" y="0"/>
+          <a:chExt cx="0" cy="0"/>
+        </a:xfrm>
+      </p:grpSpPr>
+      <p:sp>
+        <p:nvSpPr>
           <p:cNvPr id="19458" name="Rectangle 2"/>
           <p:cNvSpPr>
             <a:spLocks noGrp="1" noChangeArrowheads="1"/>
@@ -9837,7 +10162,7 @@
           <a:p>
             <a:r>
               <a:rPr lang="pt-BR" dirty="0" smtClean="0"/>
-              <a:t>29/09/204</a:t>
+              <a:t>05/12/2014</a:t>
             </a:r>
             <a:endParaRPr lang="pt-BR" dirty="0"/>
           </a:p>
@@ -9861,7 +10186,7 @@
             <a:fld id="{516476CB-12D4-456A-BCEE-8469A8C40045}" type="slidenum">
               <a:rPr lang="pt-BR" smtClean="0"/>
               <a:pPr/>
-              <a:t>38</a:t>
+              <a:t>39</a:t>
             </a:fld>
             <a:endParaRPr lang="pt-BR" dirty="0"/>
           </a:p>
@@ -9908,74 +10233,44 @@
             <p:ph idx="1"/>
           </p:nvPr>
         </p:nvSpPr>
-        <p:spPr/>
-        <p:txBody>
-          <a:bodyPr/>
-          <a:lstStyle/>
-          <a:p>
-            <a:r>
-              <a:rPr lang="pt-BR" dirty="0" smtClean="0"/>
-              <a:t>Uma ferramenta para melhorar o </a:t>
-            </a:r>
-            <a:r>
-              <a:rPr lang="pt-BR" dirty="0" smtClean="0"/>
-              <a:t>acompanhamento </a:t>
-            </a:r>
-            <a:r>
-              <a:rPr lang="pt-BR" dirty="0" smtClean="0"/>
-              <a:t>de </a:t>
-            </a:r>
-            <a:r>
-              <a:rPr lang="pt-BR" dirty="0" smtClean="0"/>
-              <a:t>pais/responsáveis na vida escolar de seus </a:t>
-            </a:r>
-            <a:r>
-              <a:rPr lang="pt-BR" dirty="0" smtClean="0"/>
-              <a:t>filhos.</a:t>
-            </a:r>
+        <p:spPr>
+          <a:xfrm>
+            <a:off x="467544" y="1600200"/>
+            <a:ext cx="8219256" cy="4472005"/>
+          </a:xfrm>
+        </p:spPr>
+        <p:txBody>
+          <a:bodyPr/>
+          <a:lstStyle/>
+          <a:p>
+            <a:r>
+              <a:rPr lang="pt-BR" dirty="0" smtClean="0"/>
+              <a:t>Uma ferramenta melhorar a gestão escolar.</a:t>
+            </a:r>
+          </a:p>
+          <a:p>
+            <a:pPr>
+              <a:buNone/>
+            </a:pPr>
             <a:endParaRPr lang="pt-BR" dirty="0" smtClean="0"/>
           </a:p>
           <a:p>
             <a:r>
               <a:rPr lang="pt-BR" dirty="0" smtClean="0"/>
-              <a:t>As </a:t>
-            </a:r>
-            <a:r>
-              <a:rPr lang="pt-BR" dirty="0" smtClean="0"/>
-              <a:t>páginas são intuitivas, de fácil navegação, não necessitando de </a:t>
-            </a:r>
-            <a:r>
-              <a:rPr lang="pt-BR" dirty="0" smtClean="0"/>
-              <a:t>treinamento. </a:t>
-            </a:r>
-            <a:endParaRPr lang="pt-BR" dirty="0" smtClean="0"/>
-          </a:p>
-          <a:p>
-            <a:r>
-              <a:rPr lang="pt-BR" dirty="0" smtClean="0"/>
-              <a:t> </a:t>
-            </a:r>
-            <a:r>
-              <a:rPr lang="pt-BR" dirty="0" smtClean="0"/>
-              <a:t>Introduzir </a:t>
-            </a:r>
-            <a:r>
-              <a:rPr lang="pt-BR" dirty="0" smtClean="0"/>
-              <a:t>novas funcionalidades no sistema, </a:t>
-            </a:r>
-            <a:r>
-              <a:rPr lang="pt-BR" dirty="0" smtClean="0"/>
-              <a:t>como: inserção </a:t>
-            </a:r>
-            <a:r>
-              <a:rPr lang="pt-BR" dirty="0" smtClean="0"/>
-              <a:t>de tarefas pelos </a:t>
-            </a:r>
-            <a:r>
-              <a:rPr lang="pt-BR" dirty="0" smtClean="0"/>
-              <a:t>professores,  organização da apresentação das tarefas em cronogramas, informar quando os pais acessarem informações.</a:t>
-            </a:r>
-            <a:endParaRPr lang="pt-BR" dirty="0" smtClean="0"/>
+              <a:t>Páginas intuitivas com fácil navegação, sem necessidade de treinamento.</a:t>
+            </a:r>
+          </a:p>
+          <a:p>
+            <a:pPr>
+              <a:buNone/>
+            </a:pPr>
+            <a:endParaRPr lang="pt-BR" sz="1400" dirty="0" smtClean="0"/>
+          </a:p>
+          <a:p>
+            <a:r>
+              <a:rPr lang="pt-BR" dirty="0" smtClean="0"/>
+              <a:t> Introduzir novas funcionalidades no sistema, como: inserção de tarefas pelos professores,  organização da apresentação das tarefas em cronogramas, informar quando os pais acessarem informações.</a:t>
+            </a:r>
           </a:p>
           <a:p>
             <a:endParaRPr lang="pt-BR" dirty="0"/>
@@ -10034,7 +10329,7 @@
           <a:p>
             <a:r>
               <a:rPr lang="pt-BR" dirty="0" smtClean="0"/>
-              <a:t>Objetivos Gerais e Específicos.</a:t>
+              <a:t>Objetivos Gerais</a:t>
             </a:r>
             <a:endParaRPr lang="pt-BR" dirty="0"/>
           </a:p>
@@ -10057,7 +10352,7 @@
           <a:p>
             <a:pPr algn="just"/>
             <a:r>
-              <a:rPr lang="pt-BR" dirty="0" smtClean="0"/>
+              <a:rPr lang="pt-BR" sz="3200" dirty="0" smtClean="0"/>
               <a:t>Implementar o GAED nas escolas que utilizam o processo manual de gestão.</a:t>
             </a:r>
           </a:p>
@@ -10065,37 +10360,44 @@
             <a:pPr algn="just">
               <a:buNone/>
             </a:pPr>
+            <a:endParaRPr lang="en-US" sz="3200" dirty="0" smtClean="0"/>
+          </a:p>
+          <a:p>
+            <a:pPr algn="just">
+              <a:buNone/>
+            </a:pPr>
+            <a:endParaRPr lang="pt-BR" sz="3200" dirty="0" smtClean="0"/>
+          </a:p>
+          <a:p>
+            <a:pPr algn="just"/>
+            <a:r>
+              <a:rPr lang="pt-BR" sz="3200" dirty="0" smtClean="0"/>
+              <a:t>Oferecer um sistema intuitivo, simples, e elegante para garantir a qualidade, usabilidade, e satisfação do cliente. </a:t>
+            </a:r>
+            <a:endParaRPr lang="pt-BR" sz="3200" dirty="0"/>
+          </a:p>
+        </p:txBody>
+      </p:sp>
+      <p:sp>
+        <p:nvSpPr>
+          <p:cNvPr id="4" name="Espaço Reservado para Data 3"/>
+          <p:cNvSpPr>
+            <a:spLocks noGrp="1"/>
+          </p:cNvSpPr>
+          <p:nvPr>
+            <p:ph type="dt" sz="half" idx="10"/>
+          </p:nvPr>
+        </p:nvSpPr>
+        <p:spPr/>
+        <p:txBody>
+          <a:bodyPr/>
+          <a:lstStyle/>
+          <a:p>
+            <a:r>
+              <a:rPr lang="pt-BR" dirty="0" smtClean="0"/>
+              <a:t>05/12/2014</a:t>
+            </a:r>
             <a:endParaRPr lang="pt-BR" dirty="0" smtClean="0"/>
-          </a:p>
-          <a:p>
-            <a:pPr algn="just"/>
-            <a:r>
-              <a:rPr lang="pt-BR" dirty="0" smtClean="0"/>
-              <a:t>Oferecer um sistema intuitivo, simples, e elegante para garantir a qualidade, usabilidade, e satisfação do cliente. </a:t>
-            </a:r>
-            <a:endParaRPr lang="pt-BR" dirty="0"/>
-          </a:p>
-        </p:txBody>
-      </p:sp>
-      <p:sp>
-        <p:nvSpPr>
-          <p:cNvPr id="4" name="Espaço Reservado para Data 3"/>
-          <p:cNvSpPr>
-            <a:spLocks noGrp="1"/>
-          </p:cNvSpPr>
-          <p:nvPr>
-            <p:ph type="dt" sz="half" idx="10"/>
-          </p:nvPr>
-        </p:nvSpPr>
-        <p:spPr/>
-        <p:txBody>
-          <a:bodyPr/>
-          <a:lstStyle/>
-          <a:p>
-            <a:r>
-              <a:rPr lang="pt-BR" dirty="0" smtClean="0"/>
-              <a:t>29/09/2014</a:t>
-            </a:r>
           </a:p>
           <a:p>
             <a:endParaRPr lang="pt-BR" dirty="0"/>
@@ -10222,26 +10524,19 @@
             <p:ph idx="1"/>
           </p:nvPr>
         </p:nvSpPr>
-        <p:spPr/>
-        <p:txBody>
-          <a:bodyPr/>
-          <a:lstStyle/>
-          <a:p>
-            <a:r>
-              <a:rPr lang="pt-BR" dirty="0" smtClean="0"/>
-              <a:t>O </a:t>
-            </a:r>
-            <a:r>
-              <a:rPr lang="pt-BR" dirty="0" err="1" smtClean="0"/>
-              <a:t>Gaed</a:t>
-            </a:r>
-            <a:r>
-              <a:rPr lang="pt-BR" dirty="0" smtClean="0"/>
-              <a:t> dever ser um sistema que  facilite e estimule a comunicação entre a escola, os alunos e seus </a:t>
-            </a:r>
-            <a:r>
-              <a:rPr lang="pt-BR" dirty="0" smtClean="0"/>
-              <a:t>responsáveis</a:t>
+        <p:spPr>
+          <a:xfrm>
+            <a:off x="467544" y="1412776"/>
+            <a:ext cx="8229600" cy="5069160"/>
+          </a:xfrm>
+        </p:spPr>
+        <p:txBody>
+          <a:bodyPr/>
+          <a:lstStyle/>
+          <a:p>
+            <a:r>
+              <a:rPr lang="pt-BR" dirty="0" smtClean="0"/>
+              <a:t>Promover um sistema que  facilite e estimule a comunicação entre escola, alunos e seus responsáveis;</a:t>
             </a:r>
           </a:p>
           <a:p>
@@ -10253,39 +10548,7 @@
           <a:p>
             <a:r>
               <a:rPr lang="en-US" dirty="0" err="1" smtClean="0"/>
-              <a:t>Estimule</a:t>
-            </a:r>
-            <a:r>
-              <a:rPr lang="en-US" dirty="0" smtClean="0"/>
-              <a:t> a </a:t>
-            </a:r>
-            <a:r>
-              <a:rPr lang="en-US" dirty="0" err="1" smtClean="0"/>
-              <a:t>organização</a:t>
-            </a:r>
-            <a:r>
-              <a:rPr lang="en-US" dirty="0" smtClean="0"/>
-              <a:t> dos </a:t>
-            </a:r>
-            <a:r>
-              <a:rPr lang="en-US" dirty="0" err="1" smtClean="0"/>
-              <a:t>alunos</a:t>
-            </a:r>
-            <a:r>
-              <a:rPr lang="en-US" dirty="0" smtClean="0"/>
-              <a:t> com </a:t>
-            </a:r>
-            <a:r>
-              <a:rPr lang="en-US" dirty="0" err="1" smtClean="0"/>
-              <a:t>tarefas</a:t>
-            </a:r>
-            <a:r>
-              <a:rPr lang="en-US" dirty="0" smtClean="0"/>
-              <a:t> e </a:t>
-            </a:r>
-            <a:r>
-              <a:rPr lang="en-US" dirty="0" err="1" smtClean="0"/>
-              <a:t>trabalhos</a:t>
+              <a:t>Estimular</a:t>
             </a:r>
             <a:r>
               <a:rPr lang="en-US" dirty="0" smtClean="0"/>
@@ -10293,7 +10556,68 @@
             </a:r>
             <a:r>
               <a:rPr lang="en-US" dirty="0" err="1" smtClean="0"/>
-              <a:t>para</a:t>
+              <a:t>acompanhamento</a:t>
+            </a:r>
+            <a:r>
+              <a:rPr lang="en-US" dirty="0" smtClean="0"/>
+              <a:t> dos alunos </a:t>
+            </a:r>
+            <a:r>
+              <a:rPr lang="en-US" dirty="0" err="1" smtClean="0"/>
+              <a:t>pelos</a:t>
+            </a:r>
+            <a:r>
+              <a:rPr lang="en-US" dirty="0" smtClean="0"/>
+              <a:t> pais, </a:t>
+            </a:r>
+            <a:r>
+              <a:rPr lang="en-US" dirty="0" err="1" smtClean="0"/>
+              <a:t>através</a:t>
+            </a:r>
+            <a:r>
+              <a:rPr lang="en-US" dirty="0" smtClean="0"/>
+              <a:t> do sistema on-line;</a:t>
+            </a:r>
+          </a:p>
+          <a:p>
+            <a:endParaRPr lang="en-US" sz="1000" dirty="0" smtClean="0"/>
+          </a:p>
+          <a:p>
+            <a:r>
+              <a:rPr lang="en-US" dirty="0" err="1" smtClean="0"/>
+              <a:t>Manter</a:t>
+            </a:r>
+            <a:r>
+              <a:rPr lang="en-US" dirty="0" smtClean="0"/>
+              <a:t> o </a:t>
+            </a:r>
+            <a:r>
+              <a:rPr lang="en-US" dirty="0" err="1" smtClean="0"/>
+              <a:t>registro</a:t>
+            </a:r>
+            <a:r>
+              <a:rPr lang="en-US" dirty="0" smtClean="0"/>
+              <a:t> digital das </a:t>
+            </a:r>
+            <a:r>
+              <a:rPr lang="en-US" dirty="0" err="1" smtClean="0"/>
+              <a:t>informações</a:t>
+            </a:r>
+            <a:r>
+              <a:rPr lang="en-US" dirty="0" smtClean="0"/>
+              <a:t>;</a:t>
+            </a:r>
+          </a:p>
+          <a:p>
+            <a:endParaRPr lang="en-US" sz="1050" dirty="0" smtClean="0"/>
+          </a:p>
+          <a:p>
+            <a:endParaRPr lang="en-US" sz="800" dirty="0" smtClean="0"/>
+          </a:p>
+          <a:p>
+            <a:r>
+              <a:rPr lang="en-US" dirty="0" err="1" smtClean="0"/>
+              <a:t>Aproveitar</a:t>
             </a:r>
             <a:r>
               <a:rPr lang="en-US" dirty="0" smtClean="0"/>
@@ -10301,7 +10625,7 @@
             </a:r>
             <a:r>
               <a:rPr lang="en-US" dirty="0" err="1" smtClean="0"/>
-              <a:t>entrega</a:t>
+              <a:t>os</a:t>
             </a:r>
             <a:r>
               <a:rPr lang="en-US" dirty="0" smtClean="0"/>
@@ -10309,7 +10633,7 @@
             </a:r>
             <a:r>
               <a:rPr lang="en-US" dirty="0" err="1" smtClean="0"/>
-              <a:t>nos</a:t>
+              <a:t>recursos</a:t>
             </a:r>
             <a:r>
               <a:rPr lang="en-US" dirty="0" smtClean="0"/>
@@ -10317,131 +10641,11 @@
             </a:r>
             <a:r>
               <a:rPr lang="en-US" dirty="0" err="1" smtClean="0"/>
-              <a:t>prazos</a:t>
+              <a:t>da</a:t>
             </a:r>
             <a:r>
               <a:rPr lang="en-US" dirty="0" smtClean="0"/>
-              <a:t>.</a:t>
-            </a:r>
-          </a:p>
-          <a:p>
-            <a:endParaRPr lang="en-US" sz="1000" dirty="0" smtClean="0"/>
-          </a:p>
-          <a:p>
-            <a:r>
-              <a:rPr lang="en-US" dirty="0" err="1" smtClean="0"/>
-              <a:t>Mantenha</a:t>
-            </a:r>
-            <a:r>
-              <a:rPr lang="en-US" dirty="0" smtClean="0"/>
-              <a:t> o </a:t>
-            </a:r>
-            <a:r>
-              <a:rPr lang="en-US" dirty="0" err="1" smtClean="0"/>
-              <a:t>registro</a:t>
-            </a:r>
-            <a:r>
-              <a:rPr lang="en-US" dirty="0" smtClean="0"/>
-              <a:t> </a:t>
-            </a:r>
-            <a:r>
-              <a:rPr lang="en-US" dirty="0" smtClean="0"/>
-              <a:t>das </a:t>
-            </a:r>
-            <a:r>
-              <a:rPr lang="en-US" dirty="0" err="1" smtClean="0"/>
-              <a:t>interações</a:t>
-            </a:r>
-            <a:r>
-              <a:rPr lang="en-US" dirty="0" smtClean="0"/>
-              <a:t>, </a:t>
-            </a:r>
-            <a:r>
-              <a:rPr lang="en-US" dirty="0" err="1" smtClean="0"/>
-              <a:t>diariamente</a:t>
-            </a:r>
-            <a:endParaRPr lang="en-US" dirty="0" smtClean="0"/>
-          </a:p>
-          <a:p>
-            <a:endParaRPr lang="en-US" sz="1050" dirty="0" smtClean="0"/>
-          </a:p>
-          <a:p>
-            <a:r>
-              <a:rPr lang="en-US" dirty="0" err="1" smtClean="0"/>
-              <a:t>Possibilidade</a:t>
-            </a:r>
-            <a:r>
-              <a:rPr lang="en-US" dirty="0" smtClean="0"/>
-              <a:t> </a:t>
-            </a:r>
-            <a:r>
-              <a:rPr lang="en-US" dirty="0" smtClean="0"/>
-              <a:t>de </a:t>
-            </a:r>
-            <a:r>
-              <a:rPr lang="en-US" dirty="0" err="1" smtClean="0"/>
-              <a:t>análise</a:t>
-            </a:r>
-            <a:r>
-              <a:rPr lang="en-US" dirty="0" smtClean="0"/>
-              <a:t> </a:t>
-            </a:r>
-            <a:r>
-              <a:rPr lang="en-US" dirty="0" err="1" smtClean="0"/>
-              <a:t>gerais</a:t>
-            </a:r>
-            <a:r>
-              <a:rPr lang="en-US" dirty="0" smtClean="0"/>
-              <a:t> </a:t>
-            </a:r>
-            <a:r>
-              <a:rPr lang="en-US" dirty="0" err="1" smtClean="0"/>
-              <a:t>desses</a:t>
-            </a:r>
-            <a:r>
-              <a:rPr lang="en-US" dirty="0" smtClean="0"/>
-              <a:t> dados</a:t>
-            </a:r>
-            <a:r>
-              <a:rPr lang="en-US" dirty="0" smtClean="0"/>
-              <a:t>.</a:t>
-            </a:r>
-          </a:p>
-          <a:p>
-            <a:endParaRPr lang="en-US" sz="800" dirty="0" smtClean="0"/>
-          </a:p>
-          <a:p>
-            <a:r>
-              <a:rPr lang="en-US" dirty="0" err="1" smtClean="0"/>
-              <a:t>Aproveitar</a:t>
-            </a:r>
-            <a:r>
-              <a:rPr lang="en-US" dirty="0" smtClean="0"/>
-              <a:t> </a:t>
-            </a:r>
-            <a:r>
-              <a:rPr lang="en-US" dirty="0" err="1" smtClean="0"/>
-              <a:t>os</a:t>
-            </a:r>
-            <a:r>
-              <a:rPr lang="en-US" dirty="0" smtClean="0"/>
-              <a:t> </a:t>
-            </a:r>
-            <a:r>
-              <a:rPr lang="en-US" dirty="0" err="1" smtClean="0"/>
-              <a:t>recursos</a:t>
-            </a:r>
-            <a:r>
-              <a:rPr lang="en-US" dirty="0" smtClean="0"/>
-              <a:t> </a:t>
-            </a:r>
-            <a:r>
-              <a:rPr lang="en-US" dirty="0" err="1" smtClean="0"/>
-              <a:t>da</a:t>
-            </a:r>
-            <a:r>
-              <a:rPr lang="en-US" dirty="0" smtClean="0"/>
-              <a:t> internet</a:t>
+              <a:t> internet;</a:t>
             </a:r>
             <a:endParaRPr lang="pt-BR" dirty="0"/>
           </a:p>
@@ -10464,8 +10668,9 @@
           <a:p>
             <a:r>
               <a:rPr lang="pt-BR" dirty="0" smtClean="0"/>
-              <a:t>29/09/2014</a:t>
-            </a:r>
+              <a:t>05/12/2014</a:t>
+            </a:r>
+            <a:endParaRPr lang="pt-BR" dirty="0" smtClean="0"/>
           </a:p>
           <a:p>
             <a:endParaRPr lang="pt-BR" dirty="0"/>
@@ -10612,24 +10817,12 @@
           </a:p>
           <a:p>
             <a:r>
-              <a:rPr lang="pt-BR" dirty="0" smtClean="0"/>
-              <a:t>Secretaria: agentes escolares</a:t>
-            </a:r>
-          </a:p>
-          <a:p>
-            <a:endParaRPr lang="en-US" sz="1000" dirty="0" smtClean="0"/>
-          </a:p>
-          <a:p>
-            <a:endParaRPr lang="pt-BR" sz="1000" dirty="0" smtClean="0"/>
-          </a:p>
-          <a:p>
-            <a:r>
               <a:rPr lang="pt-BR" b="1" dirty="0" smtClean="0"/>
-              <a:t>Professores</a:t>
-            </a:r>
-            <a:r>
-              <a:rPr lang="pt-BR" dirty="0" smtClean="0"/>
-              <a:t>: Planejam, ensinam e </a:t>
+              <a:t>Secretaria</a:t>
+            </a:r>
+            <a:r>
+              <a:rPr lang="pt-BR" dirty="0" smtClean="0"/>
+              <a:t>: agentes escolares</a:t>
             </a:r>
           </a:p>
           <a:p>
@@ -10637,44 +10830,70 @@
               <a:buNone/>
             </a:pPr>
             <a:r>
+              <a:rPr lang="en-US" dirty="0" smtClean="0"/>
+              <a:t>      -  </a:t>
+            </a:r>
+            <a:r>
               <a:rPr lang="en-US" dirty="0" err="1" smtClean="0"/>
-              <a:t>acompanham</a:t>
+              <a:t>Inserem</a:t>
             </a:r>
             <a:r>
               <a:rPr lang="en-US" dirty="0" smtClean="0"/>
-              <a:t> a </a:t>
+              <a:t>  alunos e </a:t>
             </a:r>
             <a:r>
               <a:rPr lang="en-US" dirty="0" err="1" smtClean="0"/>
-              <a:t>aprendizagem</a:t>
+              <a:t>seus</a:t>
             </a:r>
             <a:r>
               <a:rPr lang="en-US" dirty="0" smtClean="0"/>
               <a:t> </a:t>
             </a:r>
             <a:r>
+              <a:rPr lang="en-US" dirty="0" err="1" smtClean="0"/>
+              <a:t>responsáveis</a:t>
+            </a:r>
+            <a:r>
               <a:rPr lang="en-US" dirty="0" smtClean="0"/>
-              <a:t>dos </a:t>
+              <a:t>, </a:t>
             </a:r>
             <a:r>
               <a:rPr lang="en-US" dirty="0" err="1" smtClean="0"/>
-              <a:t>alunos</a:t>
-            </a:r>
-            <a:endParaRPr lang="en-US" dirty="0" smtClean="0"/>
+              <a:t>turmas</a:t>
+            </a:r>
+            <a:r>
+              <a:rPr lang="en-US" dirty="0" smtClean="0"/>
+              <a:t> e </a:t>
+            </a:r>
+            <a:r>
+              <a:rPr lang="en-US" dirty="0" err="1" smtClean="0"/>
+              <a:t>boletim</a:t>
+            </a:r>
+            <a:endParaRPr lang="pt-BR" dirty="0" smtClean="0"/>
+          </a:p>
+          <a:p>
+            <a:endParaRPr lang="en-US" sz="1000" dirty="0" smtClean="0"/>
+          </a:p>
+          <a:p>
+            <a:endParaRPr lang="pt-BR" sz="1000" dirty="0" smtClean="0"/>
+          </a:p>
+          <a:p>
+            <a:r>
+              <a:rPr lang="pt-BR" b="1" dirty="0" smtClean="0"/>
+              <a:t>Professores</a:t>
+            </a:r>
+            <a:r>
+              <a:rPr lang="pt-BR" dirty="0" smtClean="0"/>
+              <a:t>: Planejam, ensinam e avaliam os alunos </a:t>
+            </a:r>
           </a:p>
           <a:p>
             <a:pPr>
               <a:buNone/>
             </a:pPr>
-            <a:endParaRPr lang="pt-BR" dirty="0" smtClean="0"/>
-          </a:p>
-          <a:p>
-            <a:pPr>
-              <a:buNone/>
-            </a:pPr>
-            <a:r>
-              <a:rPr lang="pt-BR" dirty="0" smtClean="0"/>
-              <a:t>- Registram notas, faltas, ocorrências e atividades curriculares como tarefa, trabalho e avaliação  </a:t>
+            <a:r>
+              <a:rPr lang="pt-BR" dirty="0" smtClean="0"/>
+              <a:t>       -  Registram notas, faltas e ocorrências </a:t>
             </a:r>
           </a:p>
           <a:p>
@@ -10714,7 +10933,7 @@
           <a:p>
             <a:r>
               <a:rPr lang="pt-BR" dirty="0" smtClean="0"/>
-              <a:t>29/09/2014</a:t>
+              <a:t>05/12/2014</a:t>
             </a:r>
             <a:endParaRPr lang="pt-BR" dirty="0"/>
           </a:p>
@@ -10903,58 +11122,8 @@
             </a:pPr>
             <a:r>
               <a:rPr lang="pt-BR" dirty="0" smtClean="0"/>
-              <a:t>    Acompanham e verificam:</a:t>
-            </a:r>
-          </a:p>
-          <a:p>
-            <a:pPr>
-              <a:buNone/>
-            </a:pPr>
-            <a:r>
-              <a:rPr lang="pt-BR" dirty="0" smtClean="0"/>
-              <a:t>   notas, frequência, datas e dados de </a:t>
-            </a:r>
-            <a:r>
-              <a:rPr lang="en-US" dirty="0" err="1" smtClean="0"/>
-              <a:t>tarefas</a:t>
-            </a:r>
-            <a:r>
-              <a:rPr lang="en-US" dirty="0" smtClean="0"/>
-              <a:t>, </a:t>
-            </a:r>
-            <a:r>
-              <a:rPr lang="en-US" dirty="0" err="1" smtClean="0"/>
-              <a:t>seminários</a:t>
-            </a:r>
-            <a:r>
-              <a:rPr lang="en-US" dirty="0" smtClean="0"/>
-              <a:t>, </a:t>
-            </a:r>
-            <a:r>
-              <a:rPr lang="en-US" dirty="0" err="1" smtClean="0"/>
-              <a:t>trabalhos</a:t>
-            </a:r>
-            <a:r>
-              <a:rPr lang="en-US" dirty="0" smtClean="0"/>
-              <a:t> </a:t>
-            </a:r>
-            <a:r>
-              <a:rPr lang="en-US" dirty="0" err="1" smtClean="0"/>
-              <a:t>solicitados</a:t>
-            </a:r>
-            <a:r>
-              <a:rPr lang="en-US" dirty="0" smtClean="0"/>
-              <a:t> </a:t>
-            </a:r>
-            <a:r>
-              <a:rPr lang="en-US" dirty="0" err="1" smtClean="0"/>
-              <a:t>pelo</a:t>
-            </a:r>
-            <a:r>
-              <a:rPr lang="en-US" dirty="0" smtClean="0"/>
-              <a:t> professor.</a:t>
-            </a:r>
-            <a:endParaRPr lang="pt-BR" dirty="0" smtClean="0"/>
+              <a:t>    Acompanham e verificam:  notas, frequência, datas e comunicados e   convites e notícias da escola.</a:t>
+            </a:r>
           </a:p>
           <a:p>
             <a:pPr algn="ctr">
@@ -10981,7 +11150,7 @@
           <a:p>
             <a:r>
               <a:rPr lang="pt-BR" dirty="0" smtClean="0"/>
-              <a:t>29/09/2014</a:t>
+              <a:t>05/12/2014</a:t>
             </a:r>
             <a:endParaRPr lang="pt-BR" dirty="0"/>
           </a:p>
@@ -11118,15 +11287,7 @@
             <a:pPr algn="just"/>
             <a:r>
               <a:rPr lang="pt-BR" dirty="0" smtClean="0"/>
-              <a:t>As </a:t>
-            </a:r>
-            <a:r>
-              <a:rPr lang="pt-BR" dirty="0" smtClean="0"/>
-              <a:t>opções no mercado são inúmeras e requerem uma pesquisa apurada, comparando o que a escola necessita e o que os sistemas oferecem</a:t>
-            </a:r>
-            <a:r>
-              <a:rPr lang="pt-BR" dirty="0" smtClean="0"/>
-              <a:t>.</a:t>
+              <a:t>As opções no mercado são inúmeras e requerem uma pesquisa apurada, que compare o que a escola necessita e o que os sistemas oferecem.</a:t>
             </a:r>
           </a:p>
           <a:p>
@@ -11137,135 +11298,15 @@
             <a:pPr algn="just"/>
             <a:r>
               <a:rPr lang="en-US" dirty="0" smtClean="0"/>
-              <a:t>A internet </a:t>
+              <a:t>O GAED inova ao aliar um sistema de gestão escolar voltado para atender o cliente: pais/</a:t>
             </a:r>
             <a:r>
               <a:rPr lang="en-US" dirty="0" err="1" smtClean="0"/>
-              <a:t>permite</a:t>
+              <a:t>responsáveis</a:t>
             </a:r>
             <a:r>
               <a:rPr lang="en-US" dirty="0" smtClean="0"/>
-              <a:t> </a:t>
-            </a:r>
-            <a:r>
-              <a:rPr lang="en-US" dirty="0" err="1" smtClean="0"/>
-              <a:t>que</a:t>
-            </a:r>
-            <a:r>
-              <a:rPr lang="en-US" dirty="0" smtClean="0"/>
-              <a:t> </a:t>
-            </a:r>
-            <a:r>
-              <a:rPr lang="en-US" dirty="0" err="1" smtClean="0"/>
-              <a:t>processos</a:t>
-            </a:r>
-            <a:r>
-              <a:rPr lang="en-US" dirty="0" smtClean="0"/>
-              <a:t> e </a:t>
-            </a:r>
-            <a:r>
-              <a:rPr lang="en-US" dirty="0" err="1" smtClean="0"/>
-              <a:t>atividades</a:t>
-            </a:r>
-            <a:r>
-              <a:rPr lang="en-US" dirty="0" smtClean="0"/>
-              <a:t> </a:t>
-            </a:r>
-            <a:r>
-              <a:rPr lang="en-US" dirty="0" err="1" smtClean="0"/>
-              <a:t>sejam</a:t>
-            </a:r>
-            <a:r>
-              <a:rPr lang="en-US" dirty="0" smtClean="0"/>
-              <a:t> </a:t>
-            </a:r>
-            <a:r>
-              <a:rPr lang="en-US" dirty="0" err="1" smtClean="0"/>
-              <a:t>realizadas</a:t>
-            </a:r>
-            <a:r>
-              <a:rPr lang="en-US" dirty="0" smtClean="0"/>
-              <a:t> </a:t>
-            </a:r>
-            <a:r>
-              <a:rPr lang="en-US" dirty="0" err="1" smtClean="0"/>
-              <a:t>em</a:t>
-            </a:r>
-            <a:r>
-              <a:rPr lang="en-US" dirty="0" smtClean="0"/>
-              <a:t> </a:t>
-            </a:r>
-            <a:r>
-              <a:rPr lang="en-US" dirty="0" err="1" smtClean="0"/>
-              <a:t>qualquer</a:t>
-            </a:r>
-            <a:r>
-              <a:rPr lang="en-US" dirty="0" smtClean="0"/>
-              <a:t> </a:t>
-            </a:r>
-            <a:r>
-              <a:rPr lang="en-US" dirty="0" err="1" smtClean="0"/>
-              <a:t>lugar</a:t>
-            </a:r>
-            <a:r>
-              <a:rPr lang="en-US" dirty="0" smtClean="0"/>
-              <a:t> e </a:t>
-            </a:r>
-            <a:r>
-              <a:rPr lang="en-US" dirty="0" err="1" smtClean="0"/>
-              <a:t>horário</a:t>
-            </a:r>
-            <a:r>
-              <a:rPr lang="en-US" dirty="0" smtClean="0"/>
-              <a:t>, </a:t>
-            </a:r>
-            <a:r>
-              <a:rPr lang="en-US" dirty="0" err="1" smtClean="0"/>
-              <a:t>proporcionando</a:t>
-            </a:r>
-            <a:r>
-              <a:rPr lang="en-US" dirty="0" smtClean="0"/>
-              <a:t> </a:t>
-            </a:r>
-            <a:r>
-              <a:rPr lang="en-US" dirty="0" err="1" smtClean="0"/>
-              <a:t>uma</a:t>
-            </a:r>
-            <a:r>
-              <a:rPr lang="en-US" dirty="0" smtClean="0"/>
-              <a:t> nova </a:t>
-            </a:r>
-            <a:r>
-              <a:rPr lang="en-US" dirty="0" err="1" smtClean="0"/>
-              <a:t>opção</a:t>
-            </a:r>
-            <a:r>
-              <a:rPr lang="en-US" dirty="0" smtClean="0"/>
-              <a:t> de </a:t>
-            </a:r>
-            <a:r>
-              <a:rPr lang="en-US" dirty="0" err="1" smtClean="0"/>
-              <a:t>interação</a:t>
-            </a:r>
-            <a:r>
-              <a:rPr lang="en-US" dirty="0" smtClean="0"/>
-              <a:t> entre </a:t>
-            </a:r>
-            <a:r>
-              <a:rPr lang="en-US" dirty="0" err="1" smtClean="0"/>
-              <a:t>escola</a:t>
-            </a:r>
-            <a:r>
-              <a:rPr lang="en-US" dirty="0" smtClean="0"/>
-              <a:t> e </a:t>
-            </a:r>
-            <a:r>
-              <a:rPr lang="en-US" dirty="0" err="1" smtClean="0"/>
-              <a:t>comunidade</a:t>
-            </a:r>
-            <a:r>
-              <a:rPr lang="en-US" dirty="0" smtClean="0"/>
-              <a:t>.</a:t>
+              <a:t> dos alunos.</a:t>
             </a:r>
             <a:endParaRPr lang="pt-BR" dirty="0"/>
           </a:p>
@@ -11288,7 +11329,7 @@
           <a:p>
             <a:r>
               <a:rPr lang="pt-BR" dirty="0" smtClean="0"/>
-              <a:t>29/09/2014</a:t>
+              <a:t>05/12/2014</a:t>
             </a:r>
             <a:endParaRPr lang="pt-BR" dirty="0"/>
           </a:p>
@@ -11447,7 +11488,7 @@
           <a:p>
             <a:r>
               <a:rPr lang="pt-BR" dirty="0" smtClean="0"/>
-              <a:t>29/09/2014</a:t>
+              <a:t>05/12/2014</a:t>
             </a:r>
             <a:endParaRPr lang="pt-BR" dirty="0"/>
           </a:p>

</xml_diff>